<commit_message>
Added to presentation for seminar
</commit_message>
<xml_diff>
--- a/JoshFiles/Seminar.pptx
+++ b/JoshFiles/Seminar.pptx
@@ -5,12 +5,19 @@
     <p:sldMasterId id="2147483648" r:id="rId1"/>
   </p:sldMasterIdLst>
   <p:notesMasterIdLst>
-    <p:notesMasterId r:id="rId5"/>
+    <p:notesMasterId r:id="rId12"/>
   </p:notesMasterIdLst>
   <p:sldIdLst>
     <p:sldId id="256" r:id="rId2"/>
     <p:sldId id="257" r:id="rId3"/>
     <p:sldId id="258" r:id="rId4"/>
+    <p:sldId id="259" r:id="rId5"/>
+    <p:sldId id="260" r:id="rId6"/>
+    <p:sldId id="261" r:id="rId7"/>
+    <p:sldId id="262" r:id="rId8"/>
+    <p:sldId id="263" r:id="rId9"/>
+    <p:sldId id="265" r:id="rId10"/>
+    <p:sldId id="264" r:id="rId11"/>
   </p:sldIdLst>
   <p:sldSz cx="12192000" cy="6858000"/>
   <p:notesSz cx="6858000" cy="9144000"/>
@@ -109,6 +116,11 @@
       </a:defRPr>
     </a:lvl9pPr>
   </p:defaultTextStyle>
+  <p:extLst>
+    <p:ext uri="{EFAFB233-063F-42B5-8137-9DF3F51BA10A}">
+      <p15:sldGuideLst xmlns:p15="http://schemas.microsoft.com/office/powerpoint/2012/main"/>
+    </p:ext>
+  </p:extLst>
 </p:presentation>
 </file>
 
@@ -194,7 +206,7 @@
           <a:p>
             <a:fld id="{A32BCBB7-D247-254F-AB3B-85B0A9179C45}" type="datetimeFigureOut">
               <a:rPr lang="en-GB" smtClean="0"/>
-              <a:t>20/01/2019</a:t>
+              <a:t>21/01/2019</a:t>
             </a:fld>
             <a:endParaRPr lang="en-GB"/>
           </a:p>
@@ -534,6 +546,12 @@
           <a:p>
             <a:r>
               <a:rPr lang="en-GB" dirty="0"/>
+              <a:t>helium enrichment aid accurate design of cosmological models</a:t>
+            </a:r>
+          </a:p>
+          <a:p>
+            <a:r>
+              <a:rPr lang="en-GB" dirty="0"/>
               <a:t>modern asteroseismology techniques allow the probing of the </a:t>
             </a:r>
             <a:r>
@@ -551,7 +569,7 @@
           <a:p>
             <a:r>
               <a:rPr lang="en-GB" dirty="0"/>
-              <a:t>Pressure waves which in lower temp stars, propagate the envelope</a:t>
+              <a:t>Pressure waves which in lower temp stars, propagate the core and most importantly the envelope</a:t>
             </a:r>
           </a:p>
           <a:p>
@@ -599,6 +617,1173 @@
     <p:extLst>
       <p:ext uri="{BB962C8B-B14F-4D97-AF65-F5344CB8AC3E}">
         <p14:creationId xmlns:p14="http://schemas.microsoft.com/office/powerpoint/2010/main" val="2883814709"/>
+      </p:ext>
+    </p:extLst>
+  </p:cSld>
+  <p:clrMapOvr>
+    <a:masterClrMapping/>
+  </p:clrMapOvr>
+</p:notes>
+</file>
+
+<file path=ppt/notesSlides/notesSlide2.xml><?xml version="1.0" encoding="utf-8"?>
+<p:notes xmlns:a="http://schemas.openxmlformats.org/drawingml/2006/main" xmlns:r="http://schemas.openxmlformats.org/officeDocument/2006/relationships" xmlns:p="http://schemas.openxmlformats.org/presentationml/2006/main">
+  <p:cSld>
+    <p:spTree>
+      <p:nvGrpSpPr>
+        <p:cNvPr id="1" name=""/>
+        <p:cNvGrpSpPr/>
+        <p:nvPr/>
+      </p:nvGrpSpPr>
+      <p:grpSpPr>
+        <a:xfrm>
+          <a:off x="0" y="0"/>
+          <a:ext cx="0" cy="0"/>
+          <a:chOff x="0" y="0"/>
+          <a:chExt cx="0" cy="0"/>
+        </a:xfrm>
+      </p:grpSpPr>
+      <p:sp>
+        <p:nvSpPr>
+          <p:cNvPr id="2" name="Slide Image Placeholder 1"/>
+          <p:cNvSpPr>
+            <a:spLocks noGrp="1" noRot="1" noChangeAspect="1"/>
+          </p:cNvSpPr>
+          <p:nvPr>
+            <p:ph type="sldImg"/>
+          </p:nvPr>
+        </p:nvSpPr>
+        <p:spPr/>
+      </p:sp>
+      <p:sp>
+        <p:nvSpPr>
+          <p:cNvPr id="3" name="Notes Placeholder 2"/>
+          <p:cNvSpPr>
+            <a:spLocks noGrp="1"/>
+          </p:cNvSpPr>
+          <p:nvPr>
+            <p:ph type="body" idx="1"/>
+          </p:nvPr>
+        </p:nvSpPr>
+        <p:spPr/>
+        <p:txBody>
+          <a:bodyPr/>
+          <a:lstStyle/>
+          <a:p>
+            <a:r>
+              <a:rPr lang="en-GB" dirty="0"/>
+              <a:t>Glitch is small with high uncertainty</a:t>
+            </a:r>
+          </a:p>
+          <a:p>
+            <a:r>
+              <a:rPr lang="en-GB" dirty="0"/>
+              <a:t>Leverage the power of the ensemble by using sample of 1000+ stars</a:t>
+            </a:r>
+          </a:p>
+          <a:p>
+            <a:r>
+              <a:rPr lang="en-GB" dirty="0"/>
+              <a:t>Done by constructing a Bayesian hierarchical model to deduce the parameters</a:t>
+            </a:r>
+          </a:p>
+          <a:p>
+            <a:r>
+              <a:rPr lang="en-GB" dirty="0"/>
+              <a:t>asymptotic expansion formula</a:t>
+            </a:r>
+          </a:p>
+          <a:p>
+            <a:endParaRPr lang="en-GB" dirty="0"/>
+          </a:p>
+          <a:p>
+            <a:endParaRPr lang="en-GB" dirty="0"/>
+          </a:p>
+        </p:txBody>
+      </p:sp>
+      <p:sp>
+        <p:nvSpPr>
+          <p:cNvPr id="4" name="Slide Number Placeholder 3"/>
+          <p:cNvSpPr>
+            <a:spLocks noGrp="1"/>
+          </p:cNvSpPr>
+          <p:nvPr>
+            <p:ph type="sldNum" sz="quarter" idx="5"/>
+          </p:nvPr>
+        </p:nvSpPr>
+        <p:spPr/>
+        <p:txBody>
+          <a:bodyPr/>
+          <a:lstStyle/>
+          <a:p>
+            <a:fld id="{EB6579B8-21FE-AB44-9A5C-E2F72804AF5E}" type="slidenum">
+              <a:rPr lang="en-GB" smtClean="0"/>
+              <a:t>3</a:t>
+            </a:fld>
+            <a:endParaRPr lang="en-GB"/>
+          </a:p>
+        </p:txBody>
+      </p:sp>
+    </p:spTree>
+    <p:extLst>
+      <p:ext uri="{BB962C8B-B14F-4D97-AF65-F5344CB8AC3E}">
+        <p14:creationId xmlns:p14="http://schemas.microsoft.com/office/powerpoint/2010/main" val="2785566473"/>
+      </p:ext>
+    </p:extLst>
+  </p:cSld>
+  <p:clrMapOvr>
+    <a:masterClrMapping/>
+  </p:clrMapOvr>
+</p:notes>
+</file>
+
+<file path=ppt/notesSlides/notesSlide3.xml><?xml version="1.0" encoding="utf-8"?>
+<p:notes xmlns:a="http://schemas.openxmlformats.org/drawingml/2006/main" xmlns:r="http://schemas.openxmlformats.org/officeDocument/2006/relationships" xmlns:p="http://schemas.openxmlformats.org/presentationml/2006/main">
+  <p:cSld>
+    <p:spTree>
+      <p:nvGrpSpPr>
+        <p:cNvPr id="1" name=""/>
+        <p:cNvGrpSpPr/>
+        <p:nvPr/>
+      </p:nvGrpSpPr>
+      <p:grpSpPr>
+        <a:xfrm>
+          <a:off x="0" y="0"/>
+          <a:ext cx="0" cy="0"/>
+          <a:chOff x="0" y="0"/>
+          <a:chExt cx="0" cy="0"/>
+        </a:xfrm>
+      </p:grpSpPr>
+      <p:sp>
+        <p:nvSpPr>
+          <p:cNvPr id="2" name="Slide Image Placeholder 1"/>
+          <p:cNvSpPr>
+            <a:spLocks noGrp="1" noRot="1" noChangeAspect="1"/>
+          </p:cNvSpPr>
+          <p:nvPr>
+            <p:ph type="sldImg"/>
+          </p:nvPr>
+        </p:nvSpPr>
+        <p:spPr/>
+      </p:sp>
+      <p:sp>
+        <p:nvSpPr>
+          <p:cNvPr id="3" name="Notes Placeholder 2"/>
+          <p:cNvSpPr>
+            <a:spLocks noGrp="1"/>
+          </p:cNvSpPr>
+          <p:nvPr>
+            <p:ph type="body" idx="1"/>
+          </p:nvPr>
+        </p:nvSpPr>
+        <p:spPr/>
+        <p:txBody>
+          <a:bodyPr/>
+          <a:lstStyle/>
+          <a:p>
+            <a:pPr marL="0" marR="0" lvl="0" indent="0" algn="l" defTabSz="914400" rtl="0" eaLnBrk="1" fontAlgn="auto" latinLnBrk="0" hangingPunct="1">
+              <a:lnSpc>
+                <a:spcPct val="100000"/>
+              </a:lnSpc>
+              <a:spcBef>
+                <a:spcPts val="0"/>
+              </a:spcBef>
+              <a:spcAft>
+                <a:spcPts val="0"/>
+              </a:spcAft>
+              <a:buClrTx/>
+              <a:buSzTx/>
+              <a:buFontTx/>
+              <a:buNone/>
+              <a:tabLst/>
+              <a:defRPr/>
+            </a:pPr>
+            <a:r>
+              <a:rPr lang="en-GB" sz="1200" kern="1200" dirty="0">
+                <a:solidFill>
+                  <a:schemeClr val="tx1"/>
+                </a:solidFill>
+                <a:effectLst/>
+                <a:latin typeface="+mn-lt"/>
+                <a:ea typeface="+mn-ea"/>
+                <a:cs typeface="+mn-cs"/>
+              </a:rPr>
+              <a:t>Stan is to provide statistical inference on the parameters, affecting the Helium glitch within red giants.</a:t>
+            </a:r>
+          </a:p>
+          <a:p>
+            <a:pPr marL="0" marR="0" lvl="0" indent="0" algn="l" defTabSz="914400" rtl="0" eaLnBrk="1" fontAlgn="auto" latinLnBrk="0" hangingPunct="1">
+              <a:lnSpc>
+                <a:spcPct val="100000"/>
+              </a:lnSpc>
+              <a:spcBef>
+                <a:spcPts val="0"/>
+              </a:spcBef>
+              <a:spcAft>
+                <a:spcPts val="0"/>
+              </a:spcAft>
+              <a:buClrTx/>
+              <a:buSzTx/>
+              <a:buFontTx/>
+              <a:buNone/>
+              <a:tabLst/>
+              <a:defRPr/>
+            </a:pPr>
+            <a:r>
+              <a:rPr lang="en-GB" sz="1200" kern="1200" dirty="0">
+                <a:solidFill>
+                  <a:schemeClr val="tx1"/>
+                </a:solidFill>
+                <a:effectLst/>
+                <a:latin typeface="+mn-lt"/>
+                <a:ea typeface="+mn-ea"/>
+                <a:cs typeface="+mn-cs"/>
+              </a:rPr>
+              <a:t>allows us to harness the power of the ensemble by inferring hyperparameters shared across many thousands of red giants.</a:t>
+            </a:r>
+          </a:p>
+          <a:p>
+            <a:pPr marL="0" marR="0" lvl="0" indent="0" algn="l" defTabSz="914400" rtl="0" eaLnBrk="1" fontAlgn="auto" latinLnBrk="0" hangingPunct="1">
+              <a:lnSpc>
+                <a:spcPct val="100000"/>
+              </a:lnSpc>
+              <a:spcBef>
+                <a:spcPts val="0"/>
+              </a:spcBef>
+              <a:spcAft>
+                <a:spcPts val="0"/>
+              </a:spcAft>
+              <a:buClrTx/>
+              <a:buSzTx/>
+              <a:buFontTx/>
+              <a:buNone/>
+              <a:tabLst/>
+              <a:defRPr/>
+            </a:pPr>
+            <a:r>
+              <a:rPr lang="en-GB" sz="1200" kern="1200" dirty="0">
+                <a:solidFill>
+                  <a:schemeClr val="tx1"/>
+                </a:solidFill>
+                <a:effectLst/>
+                <a:latin typeface="+mn-lt"/>
+                <a:ea typeface="+mn-ea"/>
+                <a:cs typeface="+mn-cs"/>
+              </a:rPr>
+              <a:t>This compensates for the large error associated with a single measurement of the solar-like oscillations of red giants.</a:t>
+            </a:r>
+          </a:p>
+          <a:p>
+            <a:pPr marL="0" marR="0" lvl="0" indent="0" algn="l" defTabSz="914400" rtl="0" eaLnBrk="1" fontAlgn="auto" latinLnBrk="0" hangingPunct="1">
+              <a:lnSpc>
+                <a:spcPct val="100000"/>
+              </a:lnSpc>
+              <a:spcBef>
+                <a:spcPts val="0"/>
+              </a:spcBef>
+              <a:spcAft>
+                <a:spcPts val="0"/>
+              </a:spcAft>
+              <a:buClrTx/>
+              <a:buSzTx/>
+              <a:buFontTx/>
+              <a:buNone/>
+              <a:tabLst/>
+              <a:defRPr/>
+            </a:pPr>
+            <a:r>
+              <a:rPr lang="en-GB" sz="1200" kern="1200" dirty="0">
+                <a:solidFill>
+                  <a:schemeClr val="tx1"/>
+                </a:solidFill>
+                <a:effectLst/>
+                <a:latin typeface="+mn-lt"/>
+                <a:ea typeface="+mn-ea"/>
+                <a:cs typeface="+mn-cs"/>
+              </a:rPr>
+              <a:t>As an unknown function, there are many forms the asymptotic expansion can take, here we use </a:t>
+            </a:r>
+            <a:r>
+              <a:rPr lang="en-GB" sz="1200" kern="1200" dirty="0" err="1">
+                <a:solidFill>
+                  <a:schemeClr val="tx1"/>
+                </a:solidFill>
+                <a:effectLst/>
+                <a:latin typeface="+mn-lt"/>
+                <a:ea typeface="+mn-ea"/>
+                <a:cs typeface="+mn-cs"/>
+              </a:rPr>
+              <a:t>Vrard</a:t>
+            </a:r>
+            <a:r>
+              <a:rPr lang="en-GB" sz="1200" kern="1200" dirty="0">
+                <a:solidFill>
+                  <a:schemeClr val="tx1"/>
+                </a:solidFill>
+                <a:effectLst/>
+                <a:latin typeface="+mn-lt"/>
+                <a:ea typeface="+mn-ea"/>
+                <a:cs typeface="+mn-cs"/>
+              </a:rPr>
+              <a:t> 2014 with an additional exponential decay term.</a:t>
+            </a:r>
+          </a:p>
+          <a:p>
+            <a:pPr marL="0" marR="0" lvl="0" indent="0" algn="l" defTabSz="914400" rtl="0" eaLnBrk="1" fontAlgn="auto" latinLnBrk="0" hangingPunct="1">
+              <a:lnSpc>
+                <a:spcPct val="100000"/>
+              </a:lnSpc>
+              <a:spcBef>
+                <a:spcPts val="0"/>
+              </a:spcBef>
+              <a:spcAft>
+                <a:spcPts val="0"/>
+              </a:spcAft>
+              <a:buClrTx/>
+              <a:buSzTx/>
+              <a:buFontTx/>
+              <a:buNone/>
+              <a:tabLst/>
+              <a:defRPr/>
+            </a:pPr>
+            <a:r>
+              <a:rPr lang="en-GB" sz="1200" kern="1200" dirty="0">
+                <a:solidFill>
+                  <a:schemeClr val="tx1"/>
+                </a:solidFill>
+                <a:effectLst/>
+                <a:latin typeface="+mn-lt"/>
+                <a:ea typeface="+mn-ea"/>
+                <a:cs typeface="+mn-cs"/>
+              </a:rPr>
+              <a:t>n is mode of oscillation, epsilon is asymptotic offset, alpha is the curvature term, A is the amplitude and G is the period and </a:t>
+            </a:r>
+            <a:r>
+              <a:rPr lang="en-GB" sz="1200" kern="1200" dirty="0" err="1">
+                <a:solidFill>
+                  <a:schemeClr val="tx1"/>
+                </a:solidFill>
+                <a:effectLst/>
+                <a:latin typeface="+mn-lt"/>
+                <a:ea typeface="+mn-ea"/>
+                <a:cs typeface="+mn-cs"/>
+              </a:rPr>
+              <a:t>delNu</a:t>
+            </a:r>
+            <a:r>
+              <a:rPr lang="en-GB" sz="1200" kern="1200" dirty="0">
+                <a:solidFill>
+                  <a:schemeClr val="tx1"/>
+                </a:solidFill>
+                <a:effectLst/>
+                <a:latin typeface="+mn-lt"/>
+                <a:ea typeface="+mn-ea"/>
+                <a:cs typeface="+mn-cs"/>
+              </a:rPr>
+              <a:t> is the average frequency spacing between successive modes</a:t>
+            </a:r>
+          </a:p>
+          <a:p>
+            <a:pPr marL="0" marR="0" lvl="0" indent="0" algn="l" defTabSz="914400" rtl="0" eaLnBrk="1" fontAlgn="auto" latinLnBrk="0" hangingPunct="1">
+              <a:lnSpc>
+                <a:spcPct val="100000"/>
+              </a:lnSpc>
+              <a:spcBef>
+                <a:spcPts val="0"/>
+              </a:spcBef>
+              <a:spcAft>
+                <a:spcPts val="0"/>
+              </a:spcAft>
+              <a:buClrTx/>
+              <a:buSzTx/>
+              <a:buFontTx/>
+              <a:buNone/>
+              <a:tabLst/>
+              <a:defRPr/>
+            </a:pPr>
+            <a:r>
+              <a:rPr lang="en-GB" sz="1200" kern="1200" dirty="0">
+                <a:solidFill>
+                  <a:schemeClr val="tx1"/>
+                </a:solidFill>
+                <a:effectLst/>
+                <a:latin typeface="+mn-lt"/>
+                <a:ea typeface="+mn-ea"/>
+                <a:cs typeface="+mn-cs"/>
+              </a:rPr>
+              <a:t>Use python to setup data and interface with </a:t>
+            </a:r>
+            <a:r>
+              <a:rPr lang="en-GB" sz="1200" kern="1200" dirty="0" err="1">
+                <a:solidFill>
+                  <a:schemeClr val="tx1"/>
+                </a:solidFill>
+                <a:effectLst/>
+                <a:latin typeface="+mn-lt"/>
+                <a:ea typeface="+mn-ea"/>
+                <a:cs typeface="+mn-cs"/>
+              </a:rPr>
+              <a:t>stan</a:t>
+            </a:r>
+            <a:endParaRPr lang="en-GB" sz="1200" kern="1200" dirty="0">
+              <a:solidFill>
+                <a:schemeClr val="tx1"/>
+              </a:solidFill>
+              <a:effectLst/>
+              <a:latin typeface="+mn-lt"/>
+              <a:ea typeface="+mn-ea"/>
+              <a:cs typeface="+mn-cs"/>
+            </a:endParaRPr>
+          </a:p>
+          <a:p>
+            <a:endParaRPr lang="en-GB" dirty="0"/>
+          </a:p>
+        </p:txBody>
+      </p:sp>
+      <p:sp>
+        <p:nvSpPr>
+          <p:cNvPr id="4" name="Slide Number Placeholder 3"/>
+          <p:cNvSpPr>
+            <a:spLocks noGrp="1"/>
+          </p:cNvSpPr>
+          <p:nvPr>
+            <p:ph type="sldNum" sz="quarter" idx="5"/>
+          </p:nvPr>
+        </p:nvSpPr>
+        <p:spPr/>
+        <p:txBody>
+          <a:bodyPr/>
+          <a:lstStyle/>
+          <a:p>
+            <a:fld id="{EB6579B8-21FE-AB44-9A5C-E2F72804AF5E}" type="slidenum">
+              <a:rPr lang="en-GB" smtClean="0"/>
+              <a:t>4</a:t>
+            </a:fld>
+            <a:endParaRPr lang="en-GB"/>
+          </a:p>
+        </p:txBody>
+      </p:sp>
+    </p:spTree>
+    <p:extLst>
+      <p:ext uri="{BB962C8B-B14F-4D97-AF65-F5344CB8AC3E}">
+        <p14:creationId xmlns:p14="http://schemas.microsoft.com/office/powerpoint/2010/main" val="797081555"/>
+      </p:ext>
+    </p:extLst>
+  </p:cSld>
+  <p:clrMapOvr>
+    <a:masterClrMapping/>
+  </p:clrMapOvr>
+</p:notes>
+</file>
+
+<file path=ppt/notesSlides/notesSlide4.xml><?xml version="1.0" encoding="utf-8"?>
+<p:notes xmlns:a="http://schemas.openxmlformats.org/drawingml/2006/main" xmlns:r="http://schemas.openxmlformats.org/officeDocument/2006/relationships" xmlns:p="http://schemas.openxmlformats.org/presentationml/2006/main">
+  <p:cSld>
+    <p:spTree>
+      <p:nvGrpSpPr>
+        <p:cNvPr id="1" name=""/>
+        <p:cNvGrpSpPr/>
+        <p:nvPr/>
+      </p:nvGrpSpPr>
+      <p:grpSpPr>
+        <a:xfrm>
+          <a:off x="0" y="0"/>
+          <a:ext cx="0" cy="0"/>
+          <a:chOff x="0" y="0"/>
+          <a:chExt cx="0" cy="0"/>
+        </a:xfrm>
+      </p:grpSpPr>
+      <p:sp>
+        <p:nvSpPr>
+          <p:cNvPr id="2" name="Slide Image Placeholder 1"/>
+          <p:cNvSpPr>
+            <a:spLocks noGrp="1" noRot="1" noChangeAspect="1"/>
+          </p:cNvSpPr>
+          <p:nvPr>
+            <p:ph type="sldImg"/>
+          </p:nvPr>
+        </p:nvSpPr>
+        <p:spPr/>
+      </p:sp>
+      <p:sp>
+        <p:nvSpPr>
+          <p:cNvPr id="3" name="Notes Placeholder 2"/>
+          <p:cNvSpPr>
+            <a:spLocks noGrp="1"/>
+          </p:cNvSpPr>
+          <p:nvPr>
+            <p:ph type="body" idx="1"/>
+          </p:nvPr>
+        </p:nvSpPr>
+        <p:spPr/>
+        <p:txBody>
+          <a:bodyPr/>
+          <a:lstStyle/>
+          <a:p>
+            <a:r>
+              <a:rPr lang="en-GB" dirty="0"/>
+              <a:t>We initially used data from the Birmingham Solar Oscillation Network to test our model on a single star</a:t>
+            </a:r>
+          </a:p>
+          <a:p>
+            <a:r>
+              <a:rPr lang="en-GB" dirty="0"/>
+              <a:t>The data for successive angular degrees is plotted in an echelle diagram to show how the composition causes curvature of the echelle</a:t>
+            </a:r>
+          </a:p>
+          <a:p>
+            <a:r>
+              <a:rPr lang="en-GB" dirty="0"/>
+              <a:t>With estimated parameters our model shows a decent fit, but after using </a:t>
+            </a:r>
+            <a:r>
+              <a:rPr lang="en-GB" dirty="0" err="1"/>
+              <a:t>stan</a:t>
+            </a:r>
+            <a:r>
+              <a:rPr lang="en-GB" dirty="0"/>
+              <a:t> to deduce the parameters the fit improved greatly</a:t>
+            </a:r>
+          </a:p>
+          <a:p>
+            <a:endParaRPr lang="en-GB" dirty="0"/>
+          </a:p>
+        </p:txBody>
+      </p:sp>
+      <p:sp>
+        <p:nvSpPr>
+          <p:cNvPr id="4" name="Slide Number Placeholder 3"/>
+          <p:cNvSpPr>
+            <a:spLocks noGrp="1"/>
+          </p:cNvSpPr>
+          <p:nvPr>
+            <p:ph type="sldNum" sz="quarter" idx="5"/>
+          </p:nvPr>
+        </p:nvSpPr>
+        <p:spPr/>
+        <p:txBody>
+          <a:bodyPr/>
+          <a:lstStyle/>
+          <a:p>
+            <a:fld id="{EB6579B8-21FE-AB44-9A5C-E2F72804AF5E}" type="slidenum">
+              <a:rPr lang="en-GB" smtClean="0"/>
+              <a:t>5</a:t>
+            </a:fld>
+            <a:endParaRPr lang="en-GB"/>
+          </a:p>
+        </p:txBody>
+      </p:sp>
+    </p:spTree>
+    <p:extLst>
+      <p:ext uri="{BB962C8B-B14F-4D97-AF65-F5344CB8AC3E}">
+        <p14:creationId xmlns:p14="http://schemas.microsoft.com/office/powerpoint/2010/main" val="120798042"/>
+      </p:ext>
+    </p:extLst>
+  </p:cSld>
+  <p:clrMapOvr>
+    <a:masterClrMapping/>
+  </p:clrMapOvr>
+</p:notes>
+</file>
+
+<file path=ppt/notesSlides/notesSlide5.xml><?xml version="1.0" encoding="utf-8"?>
+<p:notes xmlns:a="http://schemas.openxmlformats.org/drawingml/2006/main" xmlns:r="http://schemas.openxmlformats.org/officeDocument/2006/relationships" xmlns:p="http://schemas.openxmlformats.org/presentationml/2006/main">
+  <p:cSld>
+    <p:spTree>
+      <p:nvGrpSpPr>
+        <p:cNvPr id="1" name=""/>
+        <p:cNvGrpSpPr/>
+        <p:nvPr/>
+      </p:nvGrpSpPr>
+      <p:grpSpPr>
+        <a:xfrm>
+          <a:off x="0" y="0"/>
+          <a:ext cx="0" cy="0"/>
+          <a:chOff x="0" y="0"/>
+          <a:chExt cx="0" cy="0"/>
+        </a:xfrm>
+      </p:grpSpPr>
+      <p:sp>
+        <p:nvSpPr>
+          <p:cNvPr id="2" name="Slide Image Placeholder 1"/>
+          <p:cNvSpPr>
+            <a:spLocks noGrp="1" noRot="1" noChangeAspect="1"/>
+          </p:cNvSpPr>
+          <p:nvPr>
+            <p:ph type="sldImg"/>
+          </p:nvPr>
+        </p:nvSpPr>
+        <p:spPr/>
+      </p:sp>
+      <p:sp>
+        <p:nvSpPr>
+          <p:cNvPr id="3" name="Notes Placeholder 2"/>
+          <p:cNvSpPr>
+            <a:spLocks noGrp="1"/>
+          </p:cNvSpPr>
+          <p:nvPr>
+            <p:ph type="body" idx="1"/>
+          </p:nvPr>
+        </p:nvSpPr>
+        <p:spPr/>
+        <p:txBody>
+          <a:bodyPr/>
+          <a:lstStyle/>
+          <a:p>
+            <a:pPr marL="0" marR="0" lvl="0" indent="0" algn="l" defTabSz="914400" rtl="0" eaLnBrk="1" fontAlgn="auto" latinLnBrk="0" hangingPunct="1">
+              <a:lnSpc>
+                <a:spcPct val="100000"/>
+              </a:lnSpc>
+              <a:spcBef>
+                <a:spcPts val="0"/>
+              </a:spcBef>
+              <a:spcAft>
+                <a:spcPts val="0"/>
+              </a:spcAft>
+              <a:buClrTx/>
+              <a:buSzTx/>
+              <a:buFontTx/>
+              <a:buNone/>
+              <a:tabLst/>
+              <a:defRPr/>
+            </a:pPr>
+            <a:r>
+              <a:rPr lang="en-GB" dirty="0"/>
+              <a:t>Kepler observes single patch of sky for four years, observing fluctuations in luminosity of stars in FOV</a:t>
+            </a:r>
+          </a:p>
+          <a:p>
+            <a:pPr marL="0" marR="0" lvl="0" indent="0" algn="l" defTabSz="914400" rtl="0" eaLnBrk="1" fontAlgn="auto" latinLnBrk="0" hangingPunct="1">
+              <a:lnSpc>
+                <a:spcPct val="100000"/>
+              </a:lnSpc>
+              <a:spcBef>
+                <a:spcPts val="0"/>
+              </a:spcBef>
+              <a:spcAft>
+                <a:spcPts val="0"/>
+              </a:spcAft>
+              <a:buClrTx/>
+              <a:buSzTx/>
+              <a:buFontTx/>
+              <a:buNone/>
+              <a:tabLst/>
+              <a:defRPr/>
+            </a:pPr>
+            <a:r>
+              <a:rPr lang="en-GB" dirty="0"/>
+              <a:t>Retired in October, it’s 9 year orbit of the sun allowed it to observe many thousands of stars over long timescales</a:t>
+            </a:r>
+          </a:p>
+          <a:p>
+            <a:pPr marL="0" marR="0" lvl="0" indent="0" algn="l" defTabSz="914400" rtl="0" eaLnBrk="1" fontAlgn="auto" latinLnBrk="0" hangingPunct="1">
+              <a:lnSpc>
+                <a:spcPct val="100000"/>
+              </a:lnSpc>
+              <a:spcBef>
+                <a:spcPts val="0"/>
+              </a:spcBef>
+              <a:spcAft>
+                <a:spcPts val="0"/>
+              </a:spcAft>
+              <a:buClrTx/>
+              <a:buSzTx/>
+              <a:buFontTx/>
+              <a:buNone/>
+              <a:tabLst/>
+              <a:defRPr/>
+            </a:pPr>
+            <a:r>
+              <a:rPr lang="en-GB" dirty="0"/>
+              <a:t>Its primary objective is to detect exoplanets by measuring the dip in intensity as they transit across the star,</a:t>
+            </a:r>
+          </a:p>
+          <a:p>
+            <a:pPr marL="0" marR="0" lvl="0" indent="0" algn="l" defTabSz="914400" rtl="0" eaLnBrk="1" fontAlgn="auto" latinLnBrk="0" hangingPunct="1">
+              <a:lnSpc>
+                <a:spcPct val="100000"/>
+              </a:lnSpc>
+              <a:spcBef>
+                <a:spcPts val="0"/>
+              </a:spcBef>
+              <a:spcAft>
+                <a:spcPts val="0"/>
+              </a:spcAft>
+              <a:buClrTx/>
+              <a:buSzTx/>
+              <a:buFontTx/>
+              <a:buNone/>
+              <a:tabLst/>
+              <a:defRPr/>
+            </a:pPr>
+            <a:r>
+              <a:rPr lang="en-GB" dirty="0"/>
+              <a:t>Because of this Kepler measures the luminosity of many thousands of stars over a very long timescale, providing excellent data for </a:t>
+            </a:r>
+            <a:r>
+              <a:rPr lang="en-GB" dirty="0" err="1"/>
+              <a:t>asteroseismic</a:t>
+            </a:r>
+            <a:r>
+              <a:rPr lang="en-GB" dirty="0"/>
+              <a:t> analysis</a:t>
+            </a:r>
+          </a:p>
+          <a:p>
+            <a:pPr marL="0" marR="0" lvl="0" indent="0" algn="l" defTabSz="914400" rtl="0" eaLnBrk="1" fontAlgn="auto" latinLnBrk="0" hangingPunct="1">
+              <a:lnSpc>
+                <a:spcPct val="100000"/>
+              </a:lnSpc>
+              <a:spcBef>
+                <a:spcPts val="0"/>
+              </a:spcBef>
+              <a:spcAft>
+                <a:spcPts val="0"/>
+              </a:spcAft>
+              <a:buClrTx/>
+              <a:buSzTx/>
+              <a:buFontTx/>
+              <a:buNone/>
+              <a:tabLst/>
+              <a:defRPr/>
+            </a:pPr>
+            <a:r>
+              <a:rPr lang="en-GB" dirty="0"/>
+              <a:t>We used the frequency and mode data to construct echelle diagrams of the l=0 angular degree as this penetrates the envelope of the stars</a:t>
+            </a:r>
+          </a:p>
+          <a:p>
+            <a:pPr marL="0" marR="0" lvl="0" indent="0" algn="l" defTabSz="914400" rtl="0" eaLnBrk="1" fontAlgn="auto" latinLnBrk="0" hangingPunct="1">
+              <a:lnSpc>
+                <a:spcPct val="100000"/>
+              </a:lnSpc>
+              <a:spcBef>
+                <a:spcPts val="0"/>
+              </a:spcBef>
+              <a:spcAft>
+                <a:spcPts val="0"/>
+              </a:spcAft>
+              <a:buClrTx/>
+              <a:buSzTx/>
+              <a:buFontTx/>
+              <a:buNone/>
+              <a:tabLst/>
+              <a:defRPr/>
+            </a:pPr>
+            <a:endParaRPr lang="en-GB" dirty="0"/>
+          </a:p>
+          <a:p>
+            <a:pPr marL="0" marR="0" lvl="0" indent="0" algn="l" defTabSz="914400" rtl="0" eaLnBrk="1" fontAlgn="auto" latinLnBrk="0" hangingPunct="1">
+              <a:lnSpc>
+                <a:spcPct val="100000"/>
+              </a:lnSpc>
+              <a:spcBef>
+                <a:spcPts val="0"/>
+              </a:spcBef>
+              <a:spcAft>
+                <a:spcPts val="0"/>
+              </a:spcAft>
+              <a:buClrTx/>
+              <a:buSzTx/>
+              <a:buFontTx/>
+              <a:buNone/>
+              <a:tabLst/>
+              <a:defRPr/>
+            </a:pPr>
+            <a:endParaRPr lang="en-GB" dirty="0"/>
+          </a:p>
+          <a:p>
+            <a:pPr marL="0" marR="0" lvl="0" indent="0" algn="l" defTabSz="914400" rtl="0" eaLnBrk="1" fontAlgn="auto" latinLnBrk="0" hangingPunct="1">
+              <a:lnSpc>
+                <a:spcPct val="100000"/>
+              </a:lnSpc>
+              <a:spcBef>
+                <a:spcPts val="0"/>
+              </a:spcBef>
+              <a:spcAft>
+                <a:spcPts val="0"/>
+              </a:spcAft>
+              <a:buClrTx/>
+              <a:buSzTx/>
+              <a:buFontTx/>
+              <a:buNone/>
+              <a:tabLst/>
+              <a:defRPr/>
+            </a:pPr>
+            <a:endParaRPr lang="en-GB" dirty="0"/>
+          </a:p>
+          <a:p>
+            <a:endParaRPr lang="en-GB" dirty="0"/>
+          </a:p>
+        </p:txBody>
+      </p:sp>
+      <p:sp>
+        <p:nvSpPr>
+          <p:cNvPr id="4" name="Slide Number Placeholder 3"/>
+          <p:cNvSpPr>
+            <a:spLocks noGrp="1"/>
+          </p:cNvSpPr>
+          <p:nvPr>
+            <p:ph type="sldNum" sz="quarter" idx="5"/>
+          </p:nvPr>
+        </p:nvSpPr>
+        <p:spPr/>
+        <p:txBody>
+          <a:bodyPr/>
+          <a:lstStyle/>
+          <a:p>
+            <a:fld id="{EB6579B8-21FE-AB44-9A5C-E2F72804AF5E}" type="slidenum">
+              <a:rPr lang="en-GB" smtClean="0"/>
+              <a:t>6</a:t>
+            </a:fld>
+            <a:endParaRPr lang="en-GB"/>
+          </a:p>
+        </p:txBody>
+      </p:sp>
+    </p:spTree>
+    <p:extLst>
+      <p:ext uri="{BB962C8B-B14F-4D97-AF65-F5344CB8AC3E}">
+        <p14:creationId xmlns:p14="http://schemas.microsoft.com/office/powerpoint/2010/main" val="3713951340"/>
+      </p:ext>
+    </p:extLst>
+  </p:cSld>
+  <p:clrMapOvr>
+    <a:masterClrMapping/>
+  </p:clrMapOvr>
+</p:notes>
+</file>
+
+<file path=ppt/notesSlides/notesSlide6.xml><?xml version="1.0" encoding="utf-8"?>
+<p:notes xmlns:a="http://schemas.openxmlformats.org/drawingml/2006/main" xmlns:r="http://schemas.openxmlformats.org/officeDocument/2006/relationships" xmlns:p="http://schemas.openxmlformats.org/presentationml/2006/main">
+  <p:cSld>
+    <p:spTree>
+      <p:nvGrpSpPr>
+        <p:cNvPr id="1" name=""/>
+        <p:cNvGrpSpPr/>
+        <p:nvPr/>
+      </p:nvGrpSpPr>
+      <p:grpSpPr>
+        <a:xfrm>
+          <a:off x="0" y="0"/>
+          <a:ext cx="0" cy="0"/>
+          <a:chOff x="0" y="0"/>
+          <a:chExt cx="0" cy="0"/>
+        </a:xfrm>
+      </p:grpSpPr>
+      <p:sp>
+        <p:nvSpPr>
+          <p:cNvPr id="2" name="Slide Image Placeholder 1"/>
+          <p:cNvSpPr>
+            <a:spLocks noGrp="1" noRot="1" noChangeAspect="1"/>
+          </p:cNvSpPr>
+          <p:nvPr>
+            <p:ph type="sldImg"/>
+          </p:nvPr>
+        </p:nvSpPr>
+        <p:spPr/>
+      </p:sp>
+      <p:sp>
+        <p:nvSpPr>
+          <p:cNvPr id="3" name="Notes Placeholder 2"/>
+          <p:cNvSpPr>
+            <a:spLocks noGrp="1"/>
+          </p:cNvSpPr>
+          <p:nvPr>
+            <p:ph type="body" idx="1"/>
+          </p:nvPr>
+        </p:nvSpPr>
+        <p:spPr/>
+        <p:txBody>
+          <a:bodyPr/>
+          <a:lstStyle/>
+          <a:p>
+            <a:r>
+              <a:rPr lang="en-GB" dirty="0"/>
+              <a:t>If successful this project will result in constraint on the Helium enrichment within red giants and a better understanding of the Helium content of the galaxy</a:t>
+            </a:r>
+          </a:p>
+          <a:p>
+            <a:r>
+              <a:rPr lang="en-GB" dirty="0"/>
+              <a:t>From GCEM most likely dependence upon metallicity, defined as the log ratio of heavy elements (metals) to hydrogen compared to the sun </a:t>
+            </a:r>
+          </a:p>
+          <a:p>
+            <a:r>
+              <a:rPr lang="en-GB" dirty="0"/>
+              <a:t>Many models use galactic parameters such as the IMF and SFR to describe the development of elements in the galaxy</a:t>
+            </a:r>
+          </a:p>
+          <a:p>
+            <a:r>
+              <a:rPr lang="en-GB" dirty="0"/>
+              <a:t>IMF is a metric to describe the initial distribution of mass within a cluster of stars</a:t>
+            </a:r>
+          </a:p>
+          <a:p>
+            <a:r>
+              <a:rPr lang="en-GB" dirty="0"/>
+              <a:t>SFR being the total mass of stars formed in a year.</a:t>
+            </a:r>
+          </a:p>
+          <a:p>
+            <a:r>
+              <a:rPr lang="en-GB" dirty="0"/>
+              <a:t>These evolutionary parameters could be incorporated into the determination of Helium enrichment</a:t>
+            </a:r>
+          </a:p>
+        </p:txBody>
+      </p:sp>
+      <p:sp>
+        <p:nvSpPr>
+          <p:cNvPr id="4" name="Slide Number Placeholder 3"/>
+          <p:cNvSpPr>
+            <a:spLocks noGrp="1"/>
+          </p:cNvSpPr>
+          <p:nvPr>
+            <p:ph type="sldNum" sz="quarter" idx="5"/>
+          </p:nvPr>
+        </p:nvSpPr>
+        <p:spPr/>
+        <p:txBody>
+          <a:bodyPr/>
+          <a:lstStyle/>
+          <a:p>
+            <a:fld id="{EB6579B8-21FE-AB44-9A5C-E2F72804AF5E}" type="slidenum">
+              <a:rPr lang="en-GB" smtClean="0"/>
+              <a:t>8</a:t>
+            </a:fld>
+            <a:endParaRPr lang="en-GB"/>
+          </a:p>
+        </p:txBody>
+      </p:sp>
+    </p:spTree>
+    <p:extLst>
+      <p:ext uri="{BB962C8B-B14F-4D97-AF65-F5344CB8AC3E}">
+        <p14:creationId xmlns:p14="http://schemas.microsoft.com/office/powerpoint/2010/main" val="1042777348"/>
+      </p:ext>
+    </p:extLst>
+  </p:cSld>
+  <p:clrMapOvr>
+    <a:masterClrMapping/>
+  </p:clrMapOvr>
+</p:notes>
+</file>
+
+<file path=ppt/notesSlides/notesSlide7.xml><?xml version="1.0" encoding="utf-8"?>
+<p:notes xmlns:a="http://schemas.openxmlformats.org/drawingml/2006/main" xmlns:r="http://schemas.openxmlformats.org/officeDocument/2006/relationships" xmlns:p="http://schemas.openxmlformats.org/presentationml/2006/main">
+  <p:cSld>
+    <p:spTree>
+      <p:nvGrpSpPr>
+        <p:cNvPr id="1" name=""/>
+        <p:cNvGrpSpPr/>
+        <p:nvPr/>
+      </p:nvGrpSpPr>
+      <p:grpSpPr>
+        <a:xfrm>
+          <a:off x="0" y="0"/>
+          <a:ext cx="0" cy="0"/>
+          <a:chOff x="0" y="0"/>
+          <a:chExt cx="0" cy="0"/>
+        </a:xfrm>
+      </p:grpSpPr>
+      <p:sp>
+        <p:nvSpPr>
+          <p:cNvPr id="2" name="Slide Image Placeholder 1"/>
+          <p:cNvSpPr>
+            <a:spLocks noGrp="1" noRot="1" noChangeAspect="1"/>
+          </p:cNvSpPr>
+          <p:nvPr>
+            <p:ph type="sldImg"/>
+          </p:nvPr>
+        </p:nvSpPr>
+        <p:spPr/>
+      </p:sp>
+      <p:sp>
+        <p:nvSpPr>
+          <p:cNvPr id="3" name="Notes Placeholder 2"/>
+          <p:cNvSpPr>
+            <a:spLocks noGrp="1"/>
+          </p:cNvSpPr>
+          <p:nvPr>
+            <p:ph type="body" idx="1"/>
+          </p:nvPr>
+        </p:nvSpPr>
+        <p:spPr/>
+        <p:txBody>
+          <a:bodyPr/>
+          <a:lstStyle/>
+          <a:p>
+            <a:r>
+              <a:rPr lang="en-GB" dirty="0"/>
+              <a:t>Currently, our model can incorporate as many stars as we wish, providing inference on parameters to constrain Helium enrichment</a:t>
+            </a:r>
+          </a:p>
+          <a:p>
+            <a:r>
+              <a:rPr lang="en-GB" dirty="0"/>
+              <a:t>Next steps are to improve the efficiency of our model by re-parameterising or using decomposition techniques</a:t>
+            </a:r>
+          </a:p>
+          <a:p>
+            <a:r>
+              <a:rPr lang="en-GB" dirty="0"/>
+              <a:t>Once the program adequately converges on the desired parameters we can begin analysing the results qualitatively</a:t>
+            </a:r>
+          </a:p>
+          <a:p>
+            <a:r>
+              <a:rPr lang="en-GB" dirty="0"/>
+              <a:t>At this point, we will compare our results to the chemical evolution models I mentioned previously</a:t>
+            </a:r>
+          </a:p>
+          <a:p>
+            <a:r>
+              <a:rPr lang="en-GB" dirty="0"/>
+              <a:t>We can conceivably develop models using another python package called </a:t>
+            </a:r>
+            <a:r>
+              <a:rPr lang="en-GB" dirty="0" err="1"/>
+              <a:t>PyChem</a:t>
+            </a:r>
+            <a:r>
+              <a:rPr lang="en-GB" dirty="0"/>
+              <a:t> in order to tailor this model to our findings</a:t>
+            </a:r>
+          </a:p>
+        </p:txBody>
+      </p:sp>
+      <p:sp>
+        <p:nvSpPr>
+          <p:cNvPr id="4" name="Slide Number Placeholder 3"/>
+          <p:cNvSpPr>
+            <a:spLocks noGrp="1"/>
+          </p:cNvSpPr>
+          <p:nvPr>
+            <p:ph type="sldNum" sz="quarter" idx="5"/>
+          </p:nvPr>
+        </p:nvSpPr>
+        <p:spPr/>
+        <p:txBody>
+          <a:bodyPr/>
+          <a:lstStyle/>
+          <a:p>
+            <a:fld id="{EB6579B8-21FE-AB44-9A5C-E2F72804AF5E}" type="slidenum">
+              <a:rPr lang="en-GB" smtClean="0"/>
+              <a:t>9</a:t>
+            </a:fld>
+            <a:endParaRPr lang="en-GB"/>
+          </a:p>
+        </p:txBody>
+      </p:sp>
+    </p:spTree>
+    <p:extLst>
+      <p:ext uri="{BB962C8B-B14F-4D97-AF65-F5344CB8AC3E}">
+        <p14:creationId xmlns:p14="http://schemas.microsoft.com/office/powerpoint/2010/main" val="4189822439"/>
+      </p:ext>
+    </p:extLst>
+  </p:cSld>
+  <p:clrMapOvr>
+    <a:masterClrMapping/>
+  </p:clrMapOvr>
+</p:notes>
+</file>
+
+<file path=ppt/notesSlides/notesSlide8.xml><?xml version="1.0" encoding="utf-8"?>
+<p:notes xmlns:a="http://schemas.openxmlformats.org/drawingml/2006/main" xmlns:r="http://schemas.openxmlformats.org/officeDocument/2006/relationships" xmlns:p="http://schemas.openxmlformats.org/presentationml/2006/main">
+  <p:cSld>
+    <p:spTree>
+      <p:nvGrpSpPr>
+        <p:cNvPr id="1" name=""/>
+        <p:cNvGrpSpPr/>
+        <p:nvPr/>
+      </p:nvGrpSpPr>
+      <p:grpSpPr>
+        <a:xfrm>
+          <a:off x="0" y="0"/>
+          <a:ext cx="0" cy="0"/>
+          <a:chOff x="0" y="0"/>
+          <a:chExt cx="0" cy="0"/>
+        </a:xfrm>
+      </p:grpSpPr>
+      <p:sp>
+        <p:nvSpPr>
+          <p:cNvPr id="2" name="Slide Image Placeholder 1"/>
+          <p:cNvSpPr>
+            <a:spLocks noGrp="1" noRot="1" noChangeAspect="1"/>
+          </p:cNvSpPr>
+          <p:nvPr>
+            <p:ph type="sldImg"/>
+          </p:nvPr>
+        </p:nvSpPr>
+        <p:spPr/>
+      </p:sp>
+      <p:sp>
+        <p:nvSpPr>
+          <p:cNvPr id="3" name="Notes Placeholder 2"/>
+          <p:cNvSpPr>
+            <a:spLocks noGrp="1"/>
+          </p:cNvSpPr>
+          <p:nvPr>
+            <p:ph type="body" idx="1"/>
+          </p:nvPr>
+        </p:nvSpPr>
+        <p:spPr/>
+        <p:txBody>
+          <a:bodyPr/>
+          <a:lstStyle/>
+          <a:p>
+            <a:r>
+              <a:rPr lang="en-GB" dirty="0"/>
+              <a:t>Project has the potential to provide understanding of an area of astronomy that has only recently become accessible.</a:t>
+            </a:r>
+          </a:p>
+          <a:p>
+            <a:r>
+              <a:rPr lang="en-GB" dirty="0"/>
+              <a:t>A tighter understanding the Helium abundance within red giants can improve models of internal composition and stellar and galactic evolution</a:t>
+            </a:r>
+          </a:p>
+          <a:p>
+            <a:r>
+              <a:rPr lang="en-GB" dirty="0"/>
+              <a:t>Now that our model works for a small sample this can be grown and developed into harnessing data from many thousands to provide an accurate result which </a:t>
+            </a:r>
+            <a:r>
+              <a:rPr lang="en-GB"/>
+              <a:t>will then</a:t>
+            </a:r>
+            <a:endParaRPr lang="en-GB" dirty="0"/>
+          </a:p>
+        </p:txBody>
+      </p:sp>
+      <p:sp>
+        <p:nvSpPr>
+          <p:cNvPr id="4" name="Slide Number Placeholder 3"/>
+          <p:cNvSpPr>
+            <a:spLocks noGrp="1"/>
+          </p:cNvSpPr>
+          <p:nvPr>
+            <p:ph type="sldNum" sz="quarter" idx="5"/>
+          </p:nvPr>
+        </p:nvSpPr>
+        <p:spPr/>
+        <p:txBody>
+          <a:bodyPr/>
+          <a:lstStyle/>
+          <a:p>
+            <a:fld id="{EB6579B8-21FE-AB44-9A5C-E2F72804AF5E}" type="slidenum">
+              <a:rPr lang="en-GB" smtClean="0"/>
+              <a:t>10</a:t>
+            </a:fld>
+            <a:endParaRPr lang="en-GB"/>
+          </a:p>
+        </p:txBody>
+      </p:sp>
+    </p:spTree>
+    <p:extLst>
+      <p:ext uri="{BB962C8B-B14F-4D97-AF65-F5344CB8AC3E}">
+        <p14:creationId xmlns:p14="http://schemas.microsoft.com/office/powerpoint/2010/main" val="4212613514"/>
       </p:ext>
     </p:extLst>
   </p:cSld>
@@ -778,7 +1963,7 @@
           <a:p>
             <a:fld id="{48A87A34-81AB-432B-8DAE-1953F412C126}" type="datetimeFigureOut">
               <a:rPr lang="en-US" dirty="0"/>
-              <a:t>1/20/19</a:t>
+              <a:t>1/21/19</a:t>
             </a:fld>
             <a:endParaRPr lang="en-US" dirty="0"/>
           </a:p>
@@ -1040,7 +2225,7 @@
           <a:p>
             <a:fld id="{48A87A34-81AB-432B-8DAE-1953F412C126}" type="datetimeFigureOut">
               <a:rPr lang="en-US" dirty="0"/>
-              <a:t>1/20/19</a:t>
+              <a:t>1/21/19</a:t>
             </a:fld>
             <a:endParaRPr lang="en-US" dirty="0"/>
           </a:p>
@@ -1267,7 +2452,7 @@
             <a:fld id="{48A87A34-81AB-432B-8DAE-1953F412C126}" type="datetimeFigureOut">
               <a:rPr lang="en-US" dirty="0"/>
               <a:pPr/>
-              <a:t>1/20/19</a:t>
+              <a:t>1/21/19</a:t>
             </a:fld>
             <a:endParaRPr lang="en-US" dirty="0"/>
           </a:p>
@@ -1573,7 +2758,7 @@
             <a:fld id="{48A87A34-81AB-432B-8DAE-1953F412C126}" type="datetimeFigureOut">
               <a:rPr lang="en-US" dirty="0"/>
               <a:pPr/>
-              <a:t>1/20/19</a:t>
+              <a:t>1/21/19</a:t>
             </a:fld>
             <a:endParaRPr lang="en-US" dirty="0"/>
           </a:p>
@@ -2042,7 +3227,7 @@
             <a:fld id="{48A87A34-81AB-432B-8DAE-1953F412C126}" type="datetimeFigureOut">
               <a:rPr lang="en-US" dirty="0"/>
               <a:pPr/>
-              <a:t>1/20/19</a:t>
+              <a:t>1/21/19</a:t>
             </a:fld>
             <a:endParaRPr lang="en-US" dirty="0"/>
           </a:p>
@@ -2584,7 +3769,7 @@
           <a:p>
             <a:fld id="{48A87A34-81AB-432B-8DAE-1953F412C126}" type="datetimeFigureOut">
               <a:rPr lang="en-US" dirty="0"/>
-              <a:t>1/20/19</a:t>
+              <a:t>1/21/19</a:t>
             </a:fld>
             <a:endParaRPr lang="en-US" dirty="0"/>
           </a:p>
@@ -3353,7 +4538,7 @@
           <a:p>
             <a:fld id="{48A87A34-81AB-432B-8DAE-1953F412C126}" type="datetimeFigureOut">
               <a:rPr lang="en-US" dirty="0"/>
-              <a:t>1/20/19</a:t>
+              <a:t>1/21/19</a:t>
             </a:fld>
             <a:endParaRPr lang="en-US" dirty="0"/>
           </a:p>
@@ -3523,7 +4708,7 @@
           <a:p>
             <a:fld id="{48A87A34-81AB-432B-8DAE-1953F412C126}" type="datetimeFigureOut">
               <a:rPr lang="en-US" dirty="0"/>
-              <a:t>1/20/19</a:t>
+              <a:t>1/21/19</a:t>
             </a:fld>
             <a:endParaRPr lang="en-US" dirty="0"/>
           </a:p>
@@ -3742,7 +4927,7 @@
             <a:fld id="{48A87A34-81AB-432B-8DAE-1953F412C126}" type="datetimeFigureOut">
               <a:rPr lang="en-US" dirty="0"/>
               <a:pPr/>
-              <a:t>1/20/19</a:t>
+              <a:t>1/21/19</a:t>
             </a:fld>
             <a:endParaRPr lang="en-US" dirty="0"/>
           </a:p>
@@ -3917,7 +5102,7 @@
           <a:p>
             <a:fld id="{48A87A34-81AB-432B-8DAE-1953F412C126}" type="datetimeFigureOut">
               <a:rPr lang="en-US" dirty="0"/>
-              <a:t>1/20/19</a:t>
+              <a:t>1/21/19</a:t>
             </a:fld>
             <a:endParaRPr lang="en-US" dirty="0"/>
           </a:p>
@@ -4202,7 +5387,7 @@
             <a:fld id="{48A87A34-81AB-432B-8DAE-1953F412C126}" type="datetimeFigureOut">
               <a:rPr lang="en-US" dirty="0"/>
               <a:pPr/>
-              <a:t>1/20/19</a:t>
+              <a:t>1/21/19</a:t>
             </a:fld>
             <a:endParaRPr lang="en-US" dirty="0"/>
           </a:p>
@@ -4439,7 +5624,7 @@
           <a:p>
             <a:fld id="{48A87A34-81AB-432B-8DAE-1953F412C126}" type="datetimeFigureOut">
               <a:rPr lang="en-US" dirty="0"/>
-              <a:t>1/20/19</a:t>
+              <a:t>1/21/19</a:t>
             </a:fld>
             <a:endParaRPr lang="en-US" dirty="0"/>
           </a:p>
@@ -4813,7 +5998,7 @@
           <a:p>
             <a:fld id="{48A87A34-81AB-432B-8DAE-1953F412C126}" type="datetimeFigureOut">
               <a:rPr lang="en-US" dirty="0"/>
-              <a:t>1/20/19</a:t>
+              <a:t>1/21/19</a:t>
             </a:fld>
             <a:endParaRPr lang="en-US" dirty="0"/>
           </a:p>
@@ -4926,7 +6111,7 @@
           <a:p>
             <a:fld id="{48A87A34-81AB-432B-8DAE-1953F412C126}" type="datetimeFigureOut">
               <a:rPr lang="en-US" dirty="0"/>
-              <a:t>1/20/19</a:t>
+              <a:t>1/21/19</a:t>
             </a:fld>
             <a:endParaRPr lang="en-US" dirty="0"/>
           </a:p>
@@ -5016,7 +6201,7 @@
           <a:p>
             <a:fld id="{48A87A34-81AB-432B-8DAE-1953F412C126}" type="datetimeFigureOut">
               <a:rPr lang="en-US" dirty="0"/>
-              <a:t>1/20/19</a:t>
+              <a:t>1/21/19</a:t>
             </a:fld>
             <a:endParaRPr lang="en-US" dirty="0"/>
           </a:p>
@@ -5260,7 +6445,7 @@
           <a:p>
             <a:fld id="{48A87A34-81AB-432B-8DAE-1953F412C126}" type="datetimeFigureOut">
               <a:rPr lang="en-US" dirty="0"/>
-              <a:t>1/20/19</a:t>
+              <a:t>1/21/19</a:t>
             </a:fld>
             <a:endParaRPr lang="en-US" dirty="0"/>
           </a:p>
@@ -5512,7 +6697,7 @@
           <a:p>
             <a:fld id="{48A87A34-81AB-432B-8DAE-1953F412C126}" type="datetimeFigureOut">
               <a:rPr lang="en-US" dirty="0"/>
-              <a:t>1/20/19</a:t>
+              <a:t>1/21/19</a:t>
             </a:fld>
             <a:endParaRPr lang="en-US" dirty="0"/>
           </a:p>
@@ -5751,7 +6936,7 @@
             <a:fld id="{48A87A34-81AB-432B-8DAE-1953F412C126}" type="datetimeFigureOut">
               <a:rPr lang="en-US" dirty="0"/>
               <a:pPr/>
-              <a:t>1/20/19</a:t>
+              <a:t>1/21/19</a:t>
             </a:fld>
             <a:endParaRPr lang="en-US" dirty="0"/>
           </a:p>
@@ -6144,6 +7329,14 @@
 <file path=ppt/slides/slide1.xml><?xml version="1.0" encoding="utf-8"?>
 <p:sld xmlns:a="http://schemas.openxmlformats.org/drawingml/2006/main" xmlns:r="http://schemas.openxmlformats.org/officeDocument/2006/relationships" xmlns:p="http://schemas.openxmlformats.org/presentationml/2006/main">
   <p:cSld>
+    <p:bg>
+      <p:bgPr>
+        <a:solidFill>
+          <a:schemeClr val="bg1"/>
+        </a:solidFill>
+        <a:effectLst/>
+      </p:bgPr>
+    </p:bg>
     <p:spTree>
       <p:nvGrpSpPr>
         <p:cNvPr id="1" name=""/>
@@ -6158,6 +7351,111 @@
           <a:chExt cx="0" cy="0"/>
         </a:xfrm>
       </p:grpSpPr>
+      <p:sp useBgFill="1">
+        <p:nvSpPr>
+          <p:cNvPr id="8" name="Rectangle 7">
+            <a:extLst>
+              <a:ext uri="{FF2B5EF4-FFF2-40B4-BE49-F238E27FC236}">
+                <a16:creationId xmlns:a16="http://schemas.microsoft.com/office/drawing/2014/main" id="{E770CA6A-B3B0-4826-A91F-B2B1F8922026}"/>
+              </a:ext>
+              <a:ext uri="{C183D7F6-B498-43B3-948B-1728B52AA6E4}">
+                <adec:decorative xmlns:adec="http://schemas.microsoft.com/office/drawing/2017/decorative" val="1"/>
+              </a:ext>
+            </a:extLst>
+          </p:cNvPr>
+          <p:cNvSpPr>
+            <a:spLocks noGrp="1" noRot="1" noChangeAspect="1" noMove="1" noResize="1" noEditPoints="1" noAdjustHandles="1" noChangeArrowheads="1" noChangeShapeType="1" noTextEdit="1"/>
+          </p:cNvSpPr>
+          <p:nvPr>
+            <p:extLst>
+              <p:ext uri="{386F3935-93C4-4BCD-93E2-E3B085C9AB24}">
+                <p16:designElem xmlns:p16="http://schemas.microsoft.com/office/powerpoint/2015/main" val="1"/>
+              </p:ext>
+            </p:extLst>
+          </p:nvPr>
+        </p:nvSpPr>
+        <p:spPr>
+          <a:xfrm>
+            <a:off x="0" y="0"/>
+            <a:ext cx="12192000" cy="6858000"/>
+          </a:xfrm>
+          <a:prstGeom prst="rect">
+            <a:avLst/>
+          </a:prstGeom>
+          <a:ln>
+            <a:noFill/>
+          </a:ln>
+        </p:spPr>
+        <p:style>
+          <a:lnRef idx="2">
+            <a:schemeClr val="accent1">
+              <a:shade val="50000"/>
+            </a:schemeClr>
+          </a:lnRef>
+          <a:fillRef idx="1">
+            <a:schemeClr val="accent1"/>
+          </a:fillRef>
+          <a:effectRef idx="0">
+            <a:schemeClr val="accent1"/>
+          </a:effectRef>
+          <a:fontRef idx="minor">
+            <a:schemeClr val="lt1"/>
+          </a:fontRef>
+        </p:style>
+        <p:txBody>
+          <a:bodyPr rtlCol="0" anchor="ctr"/>
+          <a:lstStyle/>
+          <a:p>
+            <a:pPr algn="ctr"/>
+            <a:endParaRPr lang="en-US"/>
+          </a:p>
+        </p:txBody>
+      </p:sp>
+      <p:pic>
+        <p:nvPicPr>
+          <p:cNvPr id="10" name="Picture 9">
+            <a:extLst>
+              <a:ext uri="{FF2B5EF4-FFF2-40B4-BE49-F238E27FC236}">
+                <a16:creationId xmlns:a16="http://schemas.microsoft.com/office/drawing/2014/main" id="{3C51B9DA-B0CC-480A-8EA5-4D5C3E0515B9}"/>
+              </a:ext>
+              <a:ext uri="{C183D7F6-B498-43B3-948B-1728B52AA6E4}">
+                <adec:decorative xmlns:adec="http://schemas.microsoft.com/office/drawing/2017/decorative" val="1"/>
+              </a:ext>
+            </a:extLst>
+          </p:cNvPr>
+          <p:cNvPicPr>
+            <a:picLocks noGrp="1" noRot="1" noChangeAspect="1" noMove="1" noResize="1" noEditPoints="1" noAdjustHandles="1" noChangeArrowheads="1" noChangeShapeType="1" noCrop="1"/>
+          </p:cNvPicPr>
+          <p:nvPr>
+            <p:extLst>
+              <p:ext uri="{386F3935-93C4-4BCD-93E2-E3B085C9AB24}">
+                <p16:designElem xmlns:p16="http://schemas.microsoft.com/office/powerpoint/2015/main" val="1"/>
+              </p:ext>
+            </p:extLst>
+          </p:nvPr>
+        </p:nvPicPr>
+        <p:blipFill>
+          <a:blip r:embed="rId2">
+            <a:extLst>
+              <a:ext uri="{28A0092B-C50C-407E-A947-70E740481C1C}">
+                <a14:useLocalDpi xmlns:a14="http://schemas.microsoft.com/office/drawing/2010/main" val="0"/>
+              </a:ext>
+            </a:extLst>
+          </a:blip>
+          <a:stretch>
+            <a:fillRect/>
+          </a:stretch>
+        </p:blipFill>
+        <p:spPr>
+          <a:xfrm>
+            <a:off x="0" y="4375150"/>
+            <a:ext cx="12192000" cy="2482850"/>
+          </a:xfrm>
+          <a:prstGeom prst="rect">
+            <a:avLst/>
+          </a:prstGeom>
+        </p:spPr>
+      </p:pic>
       <p:sp>
         <p:nvSpPr>
           <p:cNvPr id="2" name="Title 1">
@@ -6174,19 +7472,23 @@
             <p:ph type="ctrTitle"/>
           </p:nvPr>
         </p:nvSpPr>
-        <p:spPr/>
-        <p:txBody>
-          <a:bodyPr>
-            <a:noAutofit/>
+        <p:spPr>
+          <a:xfrm>
+            <a:off x="4976028" y="965200"/>
+            <a:ext cx="6170943" cy="4329641"/>
+          </a:xfrm>
+        </p:spPr>
+        <p:txBody>
+          <a:bodyPr anchor="ctr">
+            <a:normAutofit/>
           </a:bodyPr>
           <a:lstStyle/>
           <a:p>
-            <a:pPr algn="ctr"/>
-            <a:r>
-              <a:rPr lang="en-GB" sz="4400" b="1" dirty="0"/>
+            <a:r>
+              <a:rPr lang="en-GB" sz="5000" b="1"/>
               <a:t>Bayesian Hierarchical Modelling of Helium Signatures in Red Giant Stars</a:t>
             </a:r>
-            <a:endParaRPr lang="en-GB" sz="4400" dirty="0"/>
+            <a:endParaRPr lang="en-GB" sz="5000"/>
           </a:p>
         </p:txBody>
       </p:sp>
@@ -6208,42 +7510,210 @@
         </p:nvSpPr>
         <p:spPr>
           <a:xfrm>
-            <a:off x="1371600" y="3632200"/>
-            <a:ext cx="9448800" cy="1511299"/>
-          </a:xfrm>
-        </p:spPr>
-        <p:txBody>
-          <a:bodyPr>
+            <a:off x="965200" y="965200"/>
+            <a:ext cx="3367361" cy="4329641"/>
+          </a:xfrm>
+        </p:spPr>
+        <p:txBody>
+          <a:bodyPr anchor="ctr">
             <a:normAutofit/>
           </a:bodyPr>
           <a:lstStyle/>
           <a:p>
-            <a:pPr algn="ctr"/>
+            <a:pPr algn="r"/>
             <a:r>
               <a:rPr lang="en-GB" dirty="0"/>
               <a:t>Joshua Cardrick</a:t>
             </a:r>
-          </a:p>
-          <a:p>
-            <a:pPr algn="ctr"/>
+            <a:endParaRPr lang="en-GB"/>
+          </a:p>
+          <a:p>
+            <a:pPr algn="r"/>
             <a:r>
               <a:rPr lang="en-GB" dirty="0"/>
               <a:t>Partner: Dan Williams</a:t>
             </a:r>
-          </a:p>
-          <a:p>
-            <a:pPr algn="ctr"/>
+            <a:endParaRPr lang="en-GB"/>
+          </a:p>
+          <a:p>
+            <a:pPr algn="r"/>
             <a:r>
               <a:rPr lang="en-GB" dirty="0"/>
               <a:t>Supervisor: Guy Davies</a:t>
             </a:r>
-          </a:p>
-        </p:txBody>
-      </p:sp>
+            <a:endParaRPr lang="en-GB"/>
+          </a:p>
+        </p:txBody>
+      </p:sp>
+      <p:cxnSp>
+        <p:nvCxnSpPr>
+          <p:cNvPr id="12" name="Straight Connector 11">
+            <a:extLst>
+              <a:ext uri="{FF2B5EF4-FFF2-40B4-BE49-F238E27FC236}">
+                <a16:creationId xmlns:a16="http://schemas.microsoft.com/office/drawing/2014/main" id="{6FE641DB-A503-41DE-ACA6-36B41C6C2BE9}"/>
+              </a:ext>
+              <a:ext uri="{C183D7F6-B498-43B3-948B-1728B52AA6E4}">
+                <adec:decorative xmlns:adec="http://schemas.microsoft.com/office/drawing/2017/decorative" val="1"/>
+              </a:ext>
+            </a:extLst>
+          </p:cNvPr>
+          <p:cNvCxnSpPr>
+            <a:cxnSpLocks noGrp="1" noRot="1" noChangeAspect="1" noMove="1" noResize="1" noEditPoints="1" noAdjustHandles="1" noChangeArrowheads="1" noChangeShapeType="1"/>
+          </p:cNvCxnSpPr>
+          <p:nvPr>
+            <p:extLst>
+              <p:ext uri="{386F3935-93C4-4BCD-93E2-E3B085C9AB24}">
+                <p16:designElem xmlns:p16="http://schemas.microsoft.com/office/powerpoint/2015/main" val="1"/>
+              </p:ext>
+            </p:extLst>
+          </p:nvPr>
+        </p:nvCxnSpPr>
+        <p:spPr>
+          <a:xfrm>
+            <a:off x="4654295" y="1621260"/>
+            <a:ext cx="0" cy="3017520"/>
+          </a:xfrm>
+          <a:prstGeom prst="line">
+            <a:avLst/>
+          </a:prstGeom>
+          <a:ln w="15875">
+            <a:solidFill>
+              <a:schemeClr val="tx1"/>
+            </a:solidFill>
+          </a:ln>
+        </p:spPr>
+        <p:style>
+          <a:lnRef idx="1">
+            <a:schemeClr val="accent1"/>
+          </a:lnRef>
+          <a:fillRef idx="0">
+            <a:schemeClr val="accent1"/>
+          </a:fillRef>
+          <a:effectRef idx="0">
+            <a:schemeClr val="accent1"/>
+          </a:effectRef>
+          <a:fontRef idx="minor">
+            <a:schemeClr val="tx1"/>
+          </a:fontRef>
+        </p:style>
+      </p:cxnSp>
     </p:spTree>
     <p:extLst>
       <p:ext uri="{BB962C8B-B14F-4D97-AF65-F5344CB8AC3E}">
         <p14:creationId xmlns:p14="http://schemas.microsoft.com/office/powerpoint/2010/main" val="1417234231"/>
+      </p:ext>
+    </p:extLst>
+  </p:cSld>
+  <p:clrMapOvr>
+    <a:masterClrMapping/>
+  </p:clrMapOvr>
+</p:sld>
+</file>
+
+<file path=ppt/slides/slide10.xml><?xml version="1.0" encoding="utf-8"?>
+<p:sld xmlns:a="http://schemas.openxmlformats.org/drawingml/2006/main" xmlns:r="http://schemas.openxmlformats.org/officeDocument/2006/relationships" xmlns:p="http://schemas.openxmlformats.org/presentationml/2006/main">
+  <p:cSld>
+    <p:spTree>
+      <p:nvGrpSpPr>
+        <p:cNvPr id="1" name=""/>
+        <p:cNvGrpSpPr/>
+        <p:nvPr/>
+      </p:nvGrpSpPr>
+      <p:grpSpPr>
+        <a:xfrm>
+          <a:off x="0" y="0"/>
+          <a:ext cx="0" cy="0"/>
+          <a:chOff x="0" y="0"/>
+          <a:chExt cx="0" cy="0"/>
+        </a:xfrm>
+      </p:grpSpPr>
+      <p:sp>
+        <p:nvSpPr>
+          <p:cNvPr id="2" name="Title 1">
+            <a:extLst>
+              <a:ext uri="{FF2B5EF4-FFF2-40B4-BE49-F238E27FC236}">
+                <a16:creationId xmlns:a16="http://schemas.microsoft.com/office/drawing/2014/main" id="{6D279AAB-095F-504E-BD9F-0A6C2B593F39}"/>
+              </a:ext>
+            </a:extLst>
+          </p:cNvPr>
+          <p:cNvSpPr>
+            <a:spLocks noGrp="1"/>
+          </p:cNvSpPr>
+          <p:nvPr>
+            <p:ph type="title"/>
+          </p:nvPr>
+        </p:nvSpPr>
+        <p:spPr/>
+        <p:txBody>
+          <a:bodyPr/>
+          <a:lstStyle/>
+          <a:p>
+            <a:r>
+              <a:rPr lang="en-GB" dirty="0"/>
+              <a:t>Conclusion</a:t>
+            </a:r>
+          </a:p>
+        </p:txBody>
+      </p:sp>
+      <p:sp>
+        <p:nvSpPr>
+          <p:cNvPr id="3" name="Content Placeholder 2">
+            <a:extLst>
+              <a:ext uri="{FF2B5EF4-FFF2-40B4-BE49-F238E27FC236}">
+                <a16:creationId xmlns:a16="http://schemas.microsoft.com/office/drawing/2014/main" id="{2325AB34-E981-3F45-B812-B853CFE179C6}"/>
+              </a:ext>
+            </a:extLst>
+          </p:cNvPr>
+          <p:cNvSpPr>
+            <a:spLocks noGrp="1"/>
+          </p:cNvSpPr>
+          <p:nvPr>
+            <p:ph idx="1"/>
+          </p:nvPr>
+        </p:nvSpPr>
+        <p:spPr/>
+        <p:txBody>
+          <a:bodyPr/>
+          <a:lstStyle/>
+          <a:p>
+            <a:r>
+              <a:rPr lang="en-GB" dirty="0"/>
+              <a:t>Internal composition of stars</a:t>
+            </a:r>
+          </a:p>
+          <a:p>
+            <a:endParaRPr lang="en-GB" dirty="0"/>
+          </a:p>
+          <a:p>
+            <a:r>
+              <a:rPr lang="en-GB" dirty="0"/>
+              <a:t>Understanding of galactic evolution</a:t>
+            </a:r>
+          </a:p>
+          <a:p>
+            <a:pPr marL="0" indent="0">
+              <a:buNone/>
+            </a:pPr>
+            <a:endParaRPr lang="en-GB" dirty="0"/>
+          </a:p>
+          <a:p>
+            <a:r>
+              <a:rPr lang="en-GB" dirty="0"/>
+              <a:t>Currently developing model to provide accurate results</a:t>
+            </a:r>
+          </a:p>
+          <a:p>
+            <a:endParaRPr lang="en-GB" dirty="0"/>
+          </a:p>
+          <a:p>
+            <a:endParaRPr lang="en-GB" dirty="0"/>
+          </a:p>
+        </p:txBody>
+      </p:sp>
+    </p:spTree>
+    <p:extLst>
+      <p:ext uri="{BB962C8B-B14F-4D97-AF65-F5344CB8AC3E}">
+        <p14:creationId xmlns:p14="http://schemas.microsoft.com/office/powerpoint/2010/main" val="2332896668"/>
       </p:ext>
     </p:extLst>
   </p:cSld>
@@ -6296,7 +7766,7 @@
         </p:nvSpPr>
         <p:spPr>
           <a:xfrm>
-            <a:off x="2895600" y="764373"/>
+            <a:off x="2895600" y="512543"/>
             <a:ext cx="8610600" cy="1293028"/>
           </a:xfrm>
         </p:spPr>
@@ -6308,7 +7778,7 @@
           <a:p>
             <a:r>
               <a:rPr lang="en-GB" dirty="0"/>
-              <a:t>Context</a:t>
+              <a:t>Background</a:t>
             </a:r>
           </a:p>
         </p:txBody>
@@ -6331,8 +7801,8 @@
         </p:nvSpPr>
         <p:spPr>
           <a:xfrm>
-            <a:off x="677333" y="2194560"/>
-            <a:ext cx="5816600" cy="4024125"/>
+            <a:off x="677333" y="1491916"/>
+            <a:ext cx="5816600" cy="4726769"/>
           </a:xfrm>
         </p:spPr>
         <p:txBody>
@@ -6350,6 +7820,15 @@
             <a:endParaRPr lang="en-GB" dirty="0"/>
           </a:p>
           <a:p>
+            <a:r>
+              <a:rPr lang="en-GB" dirty="0"/>
+              <a:t>Cosmological models</a:t>
+            </a:r>
+          </a:p>
+          <a:p>
+            <a:pPr marL="0" indent="0">
+              <a:buNone/>
+            </a:pPr>
             <a:endParaRPr lang="en-GB" dirty="0"/>
           </a:p>
           <a:p>
@@ -6362,6 +7841,15 @@
             <a:endParaRPr lang="en-GB" dirty="0"/>
           </a:p>
           <a:p>
+            <a:r>
+              <a:rPr lang="en-GB" dirty="0"/>
+              <a:t>P and G modes</a:t>
+            </a:r>
+          </a:p>
+          <a:p>
+            <a:pPr marL="0" indent="0">
+              <a:buNone/>
+            </a:pPr>
             <a:endParaRPr lang="en-GB" dirty="0"/>
           </a:p>
           <a:p>
@@ -6369,6 +7857,22 @@
               <a:rPr lang="en-GB" dirty="0"/>
               <a:t>Helium Glitch</a:t>
             </a:r>
+          </a:p>
+          <a:p>
+            <a:endParaRPr lang="en-GB" dirty="0"/>
+          </a:p>
+          <a:p>
+            <a:r>
+              <a:rPr lang="en-GB" dirty="0" err="1"/>
+              <a:t>HeII</a:t>
+            </a:r>
+            <a:r>
+              <a:rPr lang="en-GB" dirty="0"/>
+              <a:t> Ionisation region</a:t>
+            </a:r>
+          </a:p>
+          <a:p>
+            <a:endParaRPr lang="en-GB" dirty="0"/>
           </a:p>
           <a:p>
             <a:endParaRPr lang="en-GB" dirty="0"/>
@@ -6397,14 +7901,140 @@
         </p:blipFill>
         <p:spPr>
           <a:xfrm>
-            <a:off x="5979583" y="1805571"/>
-            <a:ext cx="4682350" cy="4413114"/>
+            <a:off x="6800643" y="1805571"/>
+            <a:ext cx="3861290" cy="3639265"/>
           </a:xfrm>
           <a:prstGeom prst="rect">
             <a:avLst/>
           </a:prstGeom>
         </p:spPr>
       </p:pic>
+      <p:sp>
+        <p:nvSpPr>
+          <p:cNvPr id="5" name="TextBox 4">
+            <a:extLst>
+              <a:ext uri="{FF2B5EF4-FFF2-40B4-BE49-F238E27FC236}">
+                <a16:creationId xmlns:a16="http://schemas.microsoft.com/office/drawing/2014/main" id="{77AB2C41-9DFF-6E49-A6DA-84F80C08CFD2}"/>
+              </a:ext>
+            </a:extLst>
+          </p:cNvPr>
+          <p:cNvSpPr txBox="1"/>
+          <p:nvPr/>
+        </p:nvSpPr>
+        <p:spPr>
+          <a:xfrm>
+            <a:off x="6478000" y="5581995"/>
+            <a:ext cx="4506576" cy="1169551"/>
+          </a:xfrm>
+          <a:prstGeom prst="rect">
+            <a:avLst/>
+          </a:prstGeom>
+          <a:noFill/>
+        </p:spPr>
+        <p:txBody>
+          <a:bodyPr wrap="square" rtlCol="0">
+            <a:spAutoFit/>
+          </a:bodyPr>
+          <a:lstStyle/>
+          <a:p>
+            <a:r>
+              <a:rPr lang="en-GB" sz="1400" dirty="0"/>
+              <a:t>Low angular degree modes penetrate deeper.</a:t>
+            </a:r>
+          </a:p>
+          <a:p>
+            <a:r>
+              <a:rPr lang="en-GB" sz="1400" dirty="0"/>
+              <a:t>Diagram from </a:t>
+            </a:r>
+            <a:r>
+              <a:rPr lang="en-GB" sz="1400" dirty="0" err="1"/>
+              <a:t>Jørgen</a:t>
+            </a:r>
+            <a:r>
+              <a:rPr lang="en-GB" sz="1400" dirty="0"/>
+              <a:t> Christensen-Dalsgaard, </a:t>
+            </a:r>
+            <a:r>
+              <a:rPr lang="en-GB" sz="1400" dirty="0" err="1"/>
+              <a:t>Institut</a:t>
+            </a:r>
+            <a:r>
+              <a:rPr lang="en-GB" sz="1400" dirty="0"/>
+              <a:t> for </a:t>
+            </a:r>
+            <a:r>
+              <a:rPr lang="en-GB" sz="1400" dirty="0" err="1"/>
+              <a:t>Fysik</a:t>
+            </a:r>
+            <a:r>
+              <a:rPr lang="en-GB" sz="1400" dirty="0"/>
+              <a:t> </a:t>
+            </a:r>
+            <a:r>
+              <a:rPr lang="en-GB" sz="1400" dirty="0" err="1"/>
+              <a:t>og</a:t>
+            </a:r>
+            <a:r>
+              <a:rPr lang="en-GB" sz="1400" dirty="0"/>
+              <a:t> </a:t>
+            </a:r>
+            <a:r>
+              <a:rPr lang="en-GB" sz="1400" dirty="0" err="1"/>
+              <a:t>Astronomi</a:t>
+            </a:r>
+            <a:r>
+              <a:rPr lang="en-GB" sz="1400" dirty="0"/>
+              <a:t>, Aarhus </a:t>
+            </a:r>
+            <a:r>
+              <a:rPr lang="en-GB" sz="1400" dirty="0" err="1"/>
+              <a:t>Universitet</a:t>
+            </a:r>
+            <a:r>
+              <a:rPr lang="en-GB" sz="1400" dirty="0"/>
+              <a:t>, </a:t>
+            </a:r>
+            <a:r>
+              <a:rPr lang="en-GB" sz="1400" dirty="0" err="1"/>
+              <a:t>andTeoretisk</a:t>
+            </a:r>
+            <a:r>
+              <a:rPr lang="en-GB" sz="1400" dirty="0"/>
+              <a:t> </a:t>
+            </a:r>
+            <a:r>
+              <a:rPr lang="en-GB" sz="1400" dirty="0" err="1"/>
+              <a:t>Astrofysik</a:t>
+            </a:r>
+            <a:r>
+              <a:rPr lang="en-GB" sz="1400" dirty="0"/>
+              <a:t> </a:t>
+            </a:r>
+            <a:r>
+              <a:rPr lang="en-GB" sz="1400" dirty="0" err="1"/>
+              <a:t>Center</a:t>
+            </a:r>
+            <a:r>
+              <a:rPr lang="en-GB" sz="1400" dirty="0"/>
+              <a:t>, </a:t>
+            </a:r>
+            <a:r>
+              <a:rPr lang="en-GB" sz="1400" dirty="0" err="1"/>
+              <a:t>Danmarks</a:t>
+            </a:r>
+            <a:r>
+              <a:rPr lang="en-GB" sz="1400" dirty="0"/>
+              <a:t> </a:t>
+            </a:r>
+            <a:r>
+              <a:rPr lang="en-GB" sz="1400" dirty="0" err="1"/>
+              <a:t>Grundforskningsfond</a:t>
+            </a:r>
+            <a:endParaRPr lang="en-GB" sz="1400" dirty="0"/>
+          </a:p>
+        </p:txBody>
+      </p:sp>
     </p:spTree>
     <p:extLst>
       <p:ext uri="{BB962C8B-B14F-4D97-AF65-F5344CB8AC3E}">
@@ -6421,6 +8051,14 @@
 <file path=ppt/slides/slide3.xml><?xml version="1.0" encoding="utf-8"?>
 <p:sld xmlns:a="http://schemas.openxmlformats.org/drawingml/2006/main" xmlns:r="http://schemas.openxmlformats.org/officeDocument/2006/relationships" xmlns:p="http://schemas.openxmlformats.org/presentationml/2006/main">
   <p:cSld>
+    <p:bg>
+      <p:bgPr>
+        <a:solidFill>
+          <a:schemeClr val="bg1"/>
+        </a:solidFill>
+        <a:effectLst/>
+      </p:bgPr>
+    </p:bg>
     <p:spTree>
       <p:nvGrpSpPr>
         <p:cNvPr id="1" name=""/>
@@ -6451,14 +8089,21 @@
             <p:ph type="title"/>
           </p:nvPr>
         </p:nvSpPr>
-        <p:spPr/>
-        <p:txBody>
-          <a:bodyPr/>
+        <p:spPr>
+          <a:xfrm>
+            <a:off x="2904067" y="493945"/>
+            <a:ext cx="8610600" cy="1293028"/>
+          </a:xfrm>
+        </p:spPr>
+        <p:txBody>
+          <a:bodyPr>
+            <a:normAutofit/>
+          </a:bodyPr>
           <a:lstStyle/>
           <a:p>
             <a:r>
               <a:rPr lang="en-GB" dirty="0"/>
-              <a:t>Data</a:t>
+              <a:t>Method</a:t>
             </a:r>
           </a:p>
         </p:txBody>
@@ -6479,35 +8124,930 @@
             <p:ph idx="1"/>
           </p:nvPr>
         </p:nvSpPr>
-        <p:spPr/>
-        <p:txBody>
-          <a:bodyPr/>
-          <a:lstStyle/>
+        <p:spPr>
+          <a:xfrm>
+            <a:off x="677333" y="2194560"/>
+            <a:ext cx="5816600" cy="4024125"/>
+          </a:xfrm>
+        </p:spPr>
+        <p:txBody>
+          <a:bodyPr>
+            <a:normAutofit/>
+          </a:bodyPr>
+          <a:lstStyle/>
+          <a:p>
+            <a:r>
+              <a:rPr lang="en-GB" dirty="0"/>
+              <a:t>Stan</a:t>
+            </a:r>
+          </a:p>
+          <a:p>
+            <a:pPr marL="0" indent="0">
+              <a:buNone/>
+            </a:pPr>
+            <a:endParaRPr lang="en-GB" dirty="0"/>
+          </a:p>
+          <a:p>
+            <a:r>
+              <a:rPr lang="en-GB" dirty="0"/>
+              <a:t>1000+ stars</a:t>
+            </a:r>
+          </a:p>
+          <a:p>
+            <a:endParaRPr lang="en-GB" dirty="0"/>
+          </a:p>
+          <a:p>
+            <a:r>
+              <a:rPr lang="en-GB" dirty="0"/>
+              <a:t>Began with solar data from </a:t>
+            </a:r>
+            <a:r>
+              <a:rPr lang="en-GB" dirty="0" err="1"/>
+              <a:t>BiSON</a:t>
+            </a:r>
+            <a:endParaRPr lang="en-GB" dirty="0"/>
+          </a:p>
+          <a:p>
+            <a:endParaRPr lang="en-GB" dirty="0"/>
+          </a:p>
           <a:p>
             <a:r>
               <a:rPr lang="en-GB" dirty="0"/>
               <a:t>Kepler data</a:t>
             </a:r>
           </a:p>
-          <a:p>
+        </p:txBody>
+      </p:sp>
+      <p:sp>
+        <p:nvSpPr>
+          <p:cNvPr id="5" name="TextBox 4">
+            <a:extLst>
+              <a:ext uri="{FF2B5EF4-FFF2-40B4-BE49-F238E27FC236}">
+                <a16:creationId xmlns:a16="http://schemas.microsoft.com/office/drawing/2014/main" id="{72176482-136C-304A-8AAC-1643183855D9}"/>
+              </a:ext>
+            </a:extLst>
+          </p:cNvPr>
+          <p:cNvSpPr txBox="1"/>
+          <p:nvPr/>
+        </p:nvSpPr>
+        <p:spPr>
+          <a:xfrm>
+            <a:off x="6096000" y="5849352"/>
+            <a:ext cx="5020734" cy="646331"/>
+          </a:xfrm>
+          <a:prstGeom prst="rect">
+            <a:avLst/>
+          </a:prstGeom>
+          <a:noFill/>
+        </p:spPr>
+        <p:txBody>
+          <a:bodyPr wrap="square" rtlCol="0">
+            <a:spAutoFit/>
+          </a:bodyPr>
+          <a:lstStyle/>
+          <a:p>
+            <a:r>
+              <a:rPr lang="en-GB" dirty="0" err="1"/>
+              <a:t>Acyclical</a:t>
+            </a:r>
             <a:r>
               <a:rPr lang="en-GB" dirty="0"/>
-              <a:t>1000</a:t>
-            </a:r>
-            <a:r>
-              <a:rPr lang="en-GB"/>
-              <a:t>+ stars</a:t>
-            </a:r>
-          </a:p>
-          <a:p>
-            <a:endParaRPr lang="en-GB"/>
-          </a:p>
-        </p:txBody>
-      </p:sp>
+              <a:t> graph visualising the structure of the Bayesian hierarchical model  </a:t>
+            </a:r>
+          </a:p>
+        </p:txBody>
+      </p:sp>
+      <p:pic>
+        <p:nvPicPr>
+          <p:cNvPr id="6" name="Picture 5">
+            <a:extLst>
+              <a:ext uri="{FF2B5EF4-FFF2-40B4-BE49-F238E27FC236}">
+                <a16:creationId xmlns:a16="http://schemas.microsoft.com/office/drawing/2014/main" id="{D06DB73F-8E4F-9D48-A093-4AC28B8B69BC}"/>
+              </a:ext>
+            </a:extLst>
+          </p:cNvPr>
+          <p:cNvPicPr>
+            <a:picLocks noChangeAspect="1"/>
+          </p:cNvPicPr>
+          <p:nvPr/>
+        </p:nvPicPr>
+        <p:blipFill>
+          <a:blip r:embed="rId3"/>
+          <a:stretch>
+            <a:fillRect/>
+          </a:stretch>
+        </p:blipFill>
+        <p:spPr>
+          <a:xfrm>
+            <a:off x="6313873" y="1508734"/>
+            <a:ext cx="4584988" cy="4238356"/>
+          </a:xfrm>
+          <a:prstGeom prst="rect">
+            <a:avLst/>
+          </a:prstGeom>
+        </p:spPr>
+      </p:pic>
     </p:spTree>
     <p:extLst>
       <p:ext uri="{BB962C8B-B14F-4D97-AF65-F5344CB8AC3E}">
         <p14:creationId xmlns:p14="http://schemas.microsoft.com/office/powerpoint/2010/main" val="21128621"/>
+      </p:ext>
+    </p:extLst>
+  </p:cSld>
+  <p:clrMapOvr>
+    <a:masterClrMapping/>
+  </p:clrMapOvr>
+</p:sld>
+</file>
+
+<file path=ppt/slides/slide4.xml><?xml version="1.0" encoding="utf-8"?>
+<p:sld xmlns:a="http://schemas.openxmlformats.org/drawingml/2006/main" xmlns:r="http://schemas.openxmlformats.org/officeDocument/2006/relationships" xmlns:p="http://schemas.openxmlformats.org/presentationml/2006/main">
+  <p:cSld>
+    <p:spTree>
+      <p:nvGrpSpPr>
+        <p:cNvPr id="1" name=""/>
+        <p:cNvGrpSpPr/>
+        <p:nvPr/>
+      </p:nvGrpSpPr>
+      <p:grpSpPr>
+        <a:xfrm>
+          <a:off x="0" y="0"/>
+          <a:ext cx="0" cy="0"/>
+          <a:chOff x="0" y="0"/>
+          <a:chExt cx="0" cy="0"/>
+        </a:xfrm>
+      </p:grpSpPr>
+      <p:sp>
+        <p:nvSpPr>
+          <p:cNvPr id="2" name="Title 1">
+            <a:extLst>
+              <a:ext uri="{FF2B5EF4-FFF2-40B4-BE49-F238E27FC236}">
+                <a16:creationId xmlns:a16="http://schemas.microsoft.com/office/drawing/2014/main" id="{831C6215-E836-B943-B5B2-E018885B1D50}"/>
+              </a:ext>
+            </a:extLst>
+          </p:cNvPr>
+          <p:cNvSpPr>
+            <a:spLocks noGrp="1"/>
+          </p:cNvSpPr>
+          <p:nvPr>
+            <p:ph type="title"/>
+          </p:nvPr>
+        </p:nvSpPr>
+        <p:spPr/>
+        <p:txBody>
+          <a:bodyPr/>
+          <a:lstStyle/>
+          <a:p>
+            <a:r>
+              <a:rPr lang="en-GB" dirty="0"/>
+              <a:t>Stan</a:t>
+            </a:r>
+          </a:p>
+        </p:txBody>
+      </p:sp>
+      <p:sp>
+        <p:nvSpPr>
+          <p:cNvPr id="3" name="Content Placeholder 2">
+            <a:extLst>
+              <a:ext uri="{FF2B5EF4-FFF2-40B4-BE49-F238E27FC236}">
+                <a16:creationId xmlns:a16="http://schemas.microsoft.com/office/drawing/2014/main" id="{88EFBA7C-9164-D447-95E9-5CC1F82B4760}"/>
+              </a:ext>
+            </a:extLst>
+          </p:cNvPr>
+          <p:cNvSpPr>
+            <a:spLocks noGrp="1"/>
+          </p:cNvSpPr>
+          <p:nvPr>
+            <p:ph idx="1"/>
+          </p:nvPr>
+        </p:nvSpPr>
+        <p:spPr>
+          <a:xfrm>
+            <a:off x="685800" y="2057401"/>
+            <a:ext cx="10820400" cy="2570018"/>
+          </a:xfrm>
+        </p:spPr>
+        <p:txBody>
+          <a:bodyPr/>
+          <a:lstStyle/>
+          <a:p>
+            <a:r>
+              <a:rPr lang="en-GB" dirty="0"/>
+              <a:t>Statistical inference on parameters and hyperparameters</a:t>
+            </a:r>
+          </a:p>
+          <a:p>
+            <a:endParaRPr lang="en-GB" dirty="0"/>
+          </a:p>
+          <a:p>
+            <a:r>
+              <a:rPr lang="en-GB" dirty="0"/>
+              <a:t>Power of the ensemble to reduce error</a:t>
+            </a:r>
+          </a:p>
+          <a:p>
+            <a:endParaRPr lang="en-GB" dirty="0"/>
+          </a:p>
+          <a:p>
+            <a:r>
+              <a:rPr lang="en-GB" dirty="0"/>
+              <a:t>Asymptotic expansion from </a:t>
+            </a:r>
+            <a:r>
+              <a:rPr lang="en-GB" dirty="0" err="1"/>
+              <a:t>Vrard</a:t>
+            </a:r>
+            <a:r>
+              <a:rPr lang="en-GB" dirty="0"/>
+              <a:t> 2014</a:t>
+            </a:r>
+          </a:p>
+        </p:txBody>
+      </p:sp>
+      <p:pic>
+        <p:nvPicPr>
+          <p:cNvPr id="7" name="Picture 6">
+            <a:extLst>
+              <a:ext uri="{FF2B5EF4-FFF2-40B4-BE49-F238E27FC236}">
+                <a16:creationId xmlns:a16="http://schemas.microsoft.com/office/drawing/2014/main" id="{D8DB1606-3F5B-8F47-BF73-9C59CD1B3F3B}"/>
+              </a:ext>
+            </a:extLst>
+          </p:cNvPr>
+          <p:cNvPicPr>
+            <a:picLocks noChangeAspect="1"/>
+          </p:cNvPicPr>
+          <p:nvPr/>
+        </p:nvPicPr>
+        <p:blipFill>
+          <a:blip r:embed="rId3"/>
+          <a:stretch>
+            <a:fillRect/>
+          </a:stretch>
+        </p:blipFill>
+        <p:spPr>
+          <a:xfrm>
+            <a:off x="9984683" y="2057401"/>
+            <a:ext cx="1770754" cy="1780223"/>
+          </a:xfrm>
+          <a:prstGeom prst="rect">
+            <a:avLst/>
+          </a:prstGeom>
+        </p:spPr>
+      </p:pic>
+      <p:pic>
+        <p:nvPicPr>
+          <p:cNvPr id="8" name="Picture 7">
+            <a:extLst>
+              <a:ext uri="{FF2B5EF4-FFF2-40B4-BE49-F238E27FC236}">
+                <a16:creationId xmlns:a16="http://schemas.microsoft.com/office/drawing/2014/main" id="{6995171B-4FD4-714F-983C-AF5BECF5CBD0}"/>
+              </a:ext>
+            </a:extLst>
+          </p:cNvPr>
+          <p:cNvPicPr>
+            <a:picLocks noChangeAspect="1"/>
+          </p:cNvPicPr>
+          <p:nvPr/>
+        </p:nvPicPr>
+        <p:blipFill>
+          <a:blip r:embed="rId4"/>
+          <a:stretch>
+            <a:fillRect/>
+          </a:stretch>
+        </p:blipFill>
+        <p:spPr>
+          <a:xfrm>
+            <a:off x="685800" y="4781529"/>
+            <a:ext cx="10558463" cy="1299250"/>
+          </a:xfrm>
+          <a:prstGeom prst="rect">
+            <a:avLst/>
+          </a:prstGeom>
+        </p:spPr>
+      </p:pic>
+    </p:spTree>
+    <p:extLst>
+      <p:ext uri="{BB962C8B-B14F-4D97-AF65-F5344CB8AC3E}">
+        <p14:creationId xmlns:p14="http://schemas.microsoft.com/office/powerpoint/2010/main" val="3530111690"/>
+      </p:ext>
+    </p:extLst>
+  </p:cSld>
+  <p:clrMapOvr>
+    <a:masterClrMapping/>
+  </p:clrMapOvr>
+</p:sld>
+</file>
+
+<file path=ppt/slides/slide5.xml><?xml version="1.0" encoding="utf-8"?>
+<p:sld xmlns:a="http://schemas.openxmlformats.org/drawingml/2006/main" xmlns:r="http://schemas.openxmlformats.org/officeDocument/2006/relationships" xmlns:p="http://schemas.openxmlformats.org/presentationml/2006/main">
+  <p:cSld>
+    <p:spTree>
+      <p:nvGrpSpPr>
+        <p:cNvPr id="1" name=""/>
+        <p:cNvGrpSpPr/>
+        <p:nvPr/>
+      </p:nvGrpSpPr>
+      <p:grpSpPr>
+        <a:xfrm>
+          <a:off x="0" y="0"/>
+          <a:ext cx="0" cy="0"/>
+          <a:chOff x="0" y="0"/>
+          <a:chExt cx="0" cy="0"/>
+        </a:xfrm>
+      </p:grpSpPr>
+      <p:sp>
+        <p:nvSpPr>
+          <p:cNvPr id="2" name="Title 1">
+            <a:extLst>
+              <a:ext uri="{FF2B5EF4-FFF2-40B4-BE49-F238E27FC236}">
+                <a16:creationId xmlns:a16="http://schemas.microsoft.com/office/drawing/2014/main" id="{852F8E1C-E4C5-6B4E-840E-7B3F587F687D}"/>
+              </a:ext>
+            </a:extLst>
+          </p:cNvPr>
+          <p:cNvSpPr>
+            <a:spLocks noGrp="1"/>
+          </p:cNvSpPr>
+          <p:nvPr>
+            <p:ph type="title"/>
+          </p:nvPr>
+        </p:nvSpPr>
+        <p:spPr>
+          <a:xfrm>
+            <a:off x="2895599" y="4554320"/>
+            <a:ext cx="8610600" cy="1293028"/>
+          </a:xfrm>
+        </p:spPr>
+        <p:txBody>
+          <a:bodyPr/>
+          <a:lstStyle/>
+          <a:p>
+            <a:r>
+              <a:rPr lang="en-GB" dirty="0"/>
+              <a:t>Solar Data</a:t>
+            </a:r>
+          </a:p>
+        </p:txBody>
+      </p:sp>
+      <p:pic>
+        <p:nvPicPr>
+          <p:cNvPr id="4" name="Picture 3">
+            <a:extLst>
+              <a:ext uri="{FF2B5EF4-FFF2-40B4-BE49-F238E27FC236}">
+                <a16:creationId xmlns:a16="http://schemas.microsoft.com/office/drawing/2014/main" id="{B5C7FA73-94EF-E248-A5BE-4F60DC81DF66}"/>
+              </a:ext>
+            </a:extLst>
+          </p:cNvPr>
+          <p:cNvPicPr>
+            <a:picLocks noChangeAspect="1"/>
+          </p:cNvPicPr>
+          <p:nvPr/>
+        </p:nvPicPr>
+        <p:blipFill>
+          <a:blip r:embed="rId3"/>
+          <a:stretch>
+            <a:fillRect/>
+          </a:stretch>
+        </p:blipFill>
+        <p:spPr>
+          <a:xfrm>
+            <a:off x="199860" y="379211"/>
+            <a:ext cx="4048996" cy="2619374"/>
+          </a:xfrm>
+          <a:prstGeom prst="rect">
+            <a:avLst/>
+          </a:prstGeom>
+        </p:spPr>
+      </p:pic>
+      <p:pic>
+        <p:nvPicPr>
+          <p:cNvPr id="5" name="Picture 4">
+            <a:extLst>
+              <a:ext uri="{FF2B5EF4-FFF2-40B4-BE49-F238E27FC236}">
+                <a16:creationId xmlns:a16="http://schemas.microsoft.com/office/drawing/2014/main" id="{4E7C41EB-D28C-4143-89BC-A0467E5315FA}"/>
+              </a:ext>
+            </a:extLst>
+          </p:cNvPr>
+          <p:cNvPicPr>
+            <a:picLocks noChangeAspect="1"/>
+          </p:cNvPicPr>
+          <p:nvPr/>
+        </p:nvPicPr>
+        <p:blipFill>
+          <a:blip r:embed="rId4"/>
+          <a:stretch>
+            <a:fillRect/>
+          </a:stretch>
+        </p:blipFill>
+        <p:spPr>
+          <a:xfrm>
+            <a:off x="4422645" y="379211"/>
+            <a:ext cx="4172289" cy="2619374"/>
+          </a:xfrm>
+          <a:prstGeom prst="rect">
+            <a:avLst/>
+          </a:prstGeom>
+        </p:spPr>
+      </p:pic>
+      <p:pic>
+        <p:nvPicPr>
+          <p:cNvPr id="6" name="Picture 5">
+            <a:extLst>
+              <a:ext uri="{FF2B5EF4-FFF2-40B4-BE49-F238E27FC236}">
+                <a16:creationId xmlns:a16="http://schemas.microsoft.com/office/drawing/2014/main" id="{D9CF463E-C338-EC48-812D-63B60936D9CD}"/>
+              </a:ext>
+            </a:extLst>
+          </p:cNvPr>
+          <p:cNvPicPr>
+            <a:picLocks noChangeAspect="1"/>
+          </p:cNvPicPr>
+          <p:nvPr/>
+        </p:nvPicPr>
+        <p:blipFill>
+          <a:blip r:embed="rId5"/>
+          <a:stretch>
+            <a:fillRect/>
+          </a:stretch>
+        </p:blipFill>
+        <p:spPr>
+          <a:xfrm>
+            <a:off x="1886156" y="3289051"/>
+            <a:ext cx="5072978" cy="3189738"/>
+          </a:xfrm>
+          <a:prstGeom prst="rect">
+            <a:avLst/>
+          </a:prstGeom>
+        </p:spPr>
+      </p:pic>
+    </p:spTree>
+    <p:extLst>
+      <p:ext uri="{BB962C8B-B14F-4D97-AF65-F5344CB8AC3E}">
+        <p14:creationId xmlns:p14="http://schemas.microsoft.com/office/powerpoint/2010/main" val="4142327351"/>
+      </p:ext>
+    </p:extLst>
+  </p:cSld>
+  <p:clrMapOvr>
+    <a:masterClrMapping/>
+  </p:clrMapOvr>
+</p:sld>
+</file>
+
+<file path=ppt/slides/slide6.xml><?xml version="1.0" encoding="utf-8"?>
+<p:sld xmlns:a="http://schemas.openxmlformats.org/drawingml/2006/main" xmlns:r="http://schemas.openxmlformats.org/officeDocument/2006/relationships" xmlns:p="http://schemas.openxmlformats.org/presentationml/2006/main">
+  <p:cSld>
+    <p:spTree>
+      <p:nvGrpSpPr>
+        <p:cNvPr id="1" name=""/>
+        <p:cNvGrpSpPr/>
+        <p:nvPr/>
+      </p:nvGrpSpPr>
+      <p:grpSpPr>
+        <a:xfrm>
+          <a:off x="0" y="0"/>
+          <a:ext cx="0" cy="0"/>
+          <a:chOff x="0" y="0"/>
+          <a:chExt cx="0" cy="0"/>
+        </a:xfrm>
+      </p:grpSpPr>
+      <p:sp>
+        <p:nvSpPr>
+          <p:cNvPr id="2" name="Title 1">
+            <a:extLst>
+              <a:ext uri="{FF2B5EF4-FFF2-40B4-BE49-F238E27FC236}">
+                <a16:creationId xmlns:a16="http://schemas.microsoft.com/office/drawing/2014/main" id="{2EE660BA-C247-2445-A777-F86A7DAE90E1}"/>
+              </a:ext>
+            </a:extLst>
+          </p:cNvPr>
+          <p:cNvSpPr>
+            <a:spLocks noGrp="1"/>
+          </p:cNvSpPr>
+          <p:nvPr>
+            <p:ph type="title"/>
+          </p:nvPr>
+        </p:nvSpPr>
+        <p:spPr>
+          <a:xfrm>
+            <a:off x="2895600" y="764373"/>
+            <a:ext cx="8610600" cy="1293028"/>
+          </a:xfrm>
+        </p:spPr>
+        <p:txBody>
+          <a:bodyPr/>
+          <a:lstStyle/>
+          <a:p>
+            <a:r>
+              <a:rPr lang="en-GB" dirty="0"/>
+              <a:t>Kepler</a:t>
+            </a:r>
+          </a:p>
+        </p:txBody>
+      </p:sp>
+      <p:sp>
+        <p:nvSpPr>
+          <p:cNvPr id="3" name="Content Placeholder 2">
+            <a:extLst>
+              <a:ext uri="{FF2B5EF4-FFF2-40B4-BE49-F238E27FC236}">
+                <a16:creationId xmlns:a16="http://schemas.microsoft.com/office/drawing/2014/main" id="{DD86026C-DDB2-BA48-B7A8-DB2944DCDBBB}"/>
+              </a:ext>
+            </a:extLst>
+          </p:cNvPr>
+          <p:cNvSpPr>
+            <a:spLocks noGrp="1"/>
+          </p:cNvSpPr>
+          <p:nvPr>
+            <p:ph idx="1"/>
+          </p:nvPr>
+        </p:nvSpPr>
+        <p:spPr/>
+        <p:txBody>
+          <a:bodyPr/>
+          <a:lstStyle/>
+          <a:p>
+            <a:r>
+              <a:rPr lang="en-GB" dirty="0"/>
+              <a:t>Fixed field of view</a:t>
+            </a:r>
+          </a:p>
+          <a:p>
+            <a:endParaRPr lang="en-GB" dirty="0"/>
+          </a:p>
+          <a:p>
+            <a:r>
+              <a:rPr lang="en-GB" dirty="0"/>
+              <a:t>Retired in October 2018 after 9 years</a:t>
+            </a:r>
+          </a:p>
+          <a:p>
+            <a:endParaRPr lang="en-GB" dirty="0"/>
+          </a:p>
+          <a:p>
+            <a:r>
+              <a:rPr lang="en-GB" dirty="0"/>
+              <a:t>Transit Photometry</a:t>
+            </a:r>
+          </a:p>
+          <a:p>
+            <a:endParaRPr lang="en-GB" dirty="0"/>
+          </a:p>
+          <a:p>
+            <a:r>
+              <a:rPr lang="en-GB" dirty="0"/>
+              <a:t>Red giants</a:t>
+            </a:r>
+          </a:p>
+          <a:p>
+            <a:endParaRPr lang="en-GB" dirty="0"/>
+          </a:p>
+          <a:p>
+            <a:endParaRPr lang="en-GB" dirty="0"/>
+          </a:p>
+        </p:txBody>
+      </p:sp>
+    </p:spTree>
+    <p:extLst>
+      <p:ext uri="{BB962C8B-B14F-4D97-AF65-F5344CB8AC3E}">
+        <p14:creationId xmlns:p14="http://schemas.microsoft.com/office/powerpoint/2010/main" val="3730570743"/>
+      </p:ext>
+    </p:extLst>
+  </p:cSld>
+  <p:clrMapOvr>
+    <a:masterClrMapping/>
+  </p:clrMapOvr>
+</p:sld>
+</file>
+
+<file path=ppt/slides/slide7.xml><?xml version="1.0" encoding="utf-8"?>
+<p:sld xmlns:a="http://schemas.openxmlformats.org/drawingml/2006/main" xmlns:r="http://schemas.openxmlformats.org/officeDocument/2006/relationships" xmlns:p="http://schemas.openxmlformats.org/presentationml/2006/main">
+  <p:cSld>
+    <p:spTree>
+      <p:nvGrpSpPr>
+        <p:cNvPr id="1" name=""/>
+        <p:cNvGrpSpPr/>
+        <p:nvPr/>
+      </p:nvGrpSpPr>
+      <p:grpSpPr>
+        <a:xfrm>
+          <a:off x="0" y="0"/>
+          <a:ext cx="0" cy="0"/>
+          <a:chOff x="0" y="0"/>
+          <a:chExt cx="0" cy="0"/>
+        </a:xfrm>
+      </p:grpSpPr>
+      <p:sp>
+        <p:nvSpPr>
+          <p:cNvPr id="2" name="Title 1">
+            <a:extLst>
+              <a:ext uri="{FF2B5EF4-FFF2-40B4-BE49-F238E27FC236}">
+                <a16:creationId xmlns:a16="http://schemas.microsoft.com/office/drawing/2014/main" id="{EB228481-66D5-CE40-BE28-02A49FDD15F8}"/>
+              </a:ext>
+            </a:extLst>
+          </p:cNvPr>
+          <p:cNvSpPr>
+            <a:spLocks noGrp="1"/>
+          </p:cNvSpPr>
+          <p:nvPr>
+            <p:ph type="title"/>
+          </p:nvPr>
+        </p:nvSpPr>
+        <p:spPr/>
+        <p:txBody>
+          <a:bodyPr/>
+          <a:lstStyle/>
+          <a:p>
+            <a:r>
+              <a:rPr lang="en-GB" dirty="0"/>
+              <a:t>Current findings</a:t>
+            </a:r>
+          </a:p>
+        </p:txBody>
+      </p:sp>
+      <p:sp>
+        <p:nvSpPr>
+          <p:cNvPr id="3" name="Content Placeholder 2">
+            <a:extLst>
+              <a:ext uri="{FF2B5EF4-FFF2-40B4-BE49-F238E27FC236}">
+                <a16:creationId xmlns:a16="http://schemas.microsoft.com/office/drawing/2014/main" id="{B56B2A32-D148-8445-A315-6490BA425739}"/>
+              </a:ext>
+            </a:extLst>
+          </p:cNvPr>
+          <p:cNvSpPr>
+            <a:spLocks noGrp="1"/>
+          </p:cNvSpPr>
+          <p:nvPr>
+            <p:ph idx="1"/>
+          </p:nvPr>
+        </p:nvSpPr>
+        <p:spPr>
+          <a:xfrm>
+            <a:off x="685800" y="2194560"/>
+            <a:ext cx="6870032" cy="4024125"/>
+          </a:xfrm>
+        </p:spPr>
+        <p:txBody>
+          <a:bodyPr/>
+          <a:lstStyle/>
+          <a:p>
+            <a:endParaRPr lang="en-GB" dirty="0"/>
+          </a:p>
+        </p:txBody>
+      </p:sp>
+      <p:pic>
+        <p:nvPicPr>
+          <p:cNvPr id="4" name="Picture 3">
+            <a:extLst>
+              <a:ext uri="{FF2B5EF4-FFF2-40B4-BE49-F238E27FC236}">
+                <a16:creationId xmlns:a16="http://schemas.microsoft.com/office/drawing/2014/main" id="{41BFACEC-534E-9746-9CF8-9A92FA71DEB3}"/>
+              </a:ext>
+            </a:extLst>
+          </p:cNvPr>
+          <p:cNvPicPr>
+            <a:picLocks noChangeAspect="1"/>
+          </p:cNvPicPr>
+          <p:nvPr/>
+        </p:nvPicPr>
+        <p:blipFill rotWithShape="1">
+          <a:blip r:embed="rId2"/>
+          <a:srcRect r="3473"/>
+          <a:stretch/>
+        </p:blipFill>
+        <p:spPr>
+          <a:xfrm>
+            <a:off x="6890501" y="1828799"/>
+            <a:ext cx="4811797" cy="2120345"/>
+          </a:xfrm>
+          <a:prstGeom prst="rect">
+            <a:avLst/>
+          </a:prstGeom>
+        </p:spPr>
+      </p:pic>
+    </p:spTree>
+    <p:extLst>
+      <p:ext uri="{BB962C8B-B14F-4D97-AF65-F5344CB8AC3E}">
+        <p14:creationId xmlns:p14="http://schemas.microsoft.com/office/powerpoint/2010/main" val="1738210778"/>
+      </p:ext>
+    </p:extLst>
+  </p:cSld>
+  <p:clrMapOvr>
+    <a:masterClrMapping/>
+  </p:clrMapOvr>
+</p:sld>
+</file>
+
+<file path=ppt/slides/slide8.xml><?xml version="1.0" encoding="utf-8"?>
+<p:sld xmlns:a="http://schemas.openxmlformats.org/drawingml/2006/main" xmlns:r="http://schemas.openxmlformats.org/officeDocument/2006/relationships" xmlns:p="http://schemas.openxmlformats.org/presentationml/2006/main">
+  <p:cSld>
+    <p:spTree>
+      <p:nvGrpSpPr>
+        <p:cNvPr id="1" name=""/>
+        <p:cNvGrpSpPr/>
+        <p:nvPr/>
+      </p:nvGrpSpPr>
+      <p:grpSpPr>
+        <a:xfrm>
+          <a:off x="0" y="0"/>
+          <a:ext cx="0" cy="0"/>
+          <a:chOff x="0" y="0"/>
+          <a:chExt cx="0" cy="0"/>
+        </a:xfrm>
+      </p:grpSpPr>
+      <p:sp>
+        <p:nvSpPr>
+          <p:cNvPr id="2" name="Title 1">
+            <a:extLst>
+              <a:ext uri="{FF2B5EF4-FFF2-40B4-BE49-F238E27FC236}">
+                <a16:creationId xmlns:a16="http://schemas.microsoft.com/office/drawing/2014/main" id="{83CDA5BC-FD27-7A43-AD5B-E29CE141D7C6}"/>
+              </a:ext>
+            </a:extLst>
+          </p:cNvPr>
+          <p:cNvSpPr>
+            <a:spLocks noGrp="1"/>
+          </p:cNvSpPr>
+          <p:nvPr>
+            <p:ph type="title"/>
+          </p:nvPr>
+        </p:nvSpPr>
+        <p:spPr/>
+        <p:txBody>
+          <a:bodyPr/>
+          <a:lstStyle/>
+          <a:p>
+            <a:r>
+              <a:rPr lang="en-GB" dirty="0"/>
+              <a:t>Predictions</a:t>
+            </a:r>
+          </a:p>
+        </p:txBody>
+      </p:sp>
+      <p:sp>
+        <p:nvSpPr>
+          <p:cNvPr id="3" name="Content Placeholder 2">
+            <a:extLst>
+              <a:ext uri="{FF2B5EF4-FFF2-40B4-BE49-F238E27FC236}">
+                <a16:creationId xmlns:a16="http://schemas.microsoft.com/office/drawing/2014/main" id="{6CE5707C-141C-3140-B1A4-167A74476A1B}"/>
+              </a:ext>
+            </a:extLst>
+          </p:cNvPr>
+          <p:cNvSpPr>
+            <a:spLocks noGrp="1"/>
+          </p:cNvSpPr>
+          <p:nvPr>
+            <p:ph idx="1"/>
+          </p:nvPr>
+        </p:nvSpPr>
+        <p:spPr/>
+        <p:txBody>
+          <a:bodyPr/>
+          <a:lstStyle/>
+          <a:p>
+            <a:r>
+              <a:rPr lang="en-GB" dirty="0"/>
+              <a:t>Galactic chemical evolution models</a:t>
+            </a:r>
+          </a:p>
+          <a:p>
+            <a:endParaRPr lang="en-GB" dirty="0"/>
+          </a:p>
+          <a:p>
+            <a:r>
+              <a:rPr lang="en-GB" dirty="0"/>
+              <a:t>Dependence on metallicity</a:t>
+            </a:r>
+          </a:p>
+          <a:p>
+            <a:endParaRPr lang="en-GB" dirty="0"/>
+          </a:p>
+          <a:p>
+            <a:r>
+              <a:rPr lang="en-GB" dirty="0"/>
+              <a:t>Initial Mass Function</a:t>
+            </a:r>
+          </a:p>
+          <a:p>
+            <a:endParaRPr lang="en-GB" dirty="0"/>
+          </a:p>
+          <a:p>
+            <a:r>
+              <a:rPr lang="en-GB" dirty="0"/>
+              <a:t>Star Formation Rate</a:t>
+            </a:r>
+          </a:p>
+        </p:txBody>
+      </p:sp>
+      <p:pic>
+        <p:nvPicPr>
+          <p:cNvPr id="4" name="Picture 3">
+            <a:extLst>
+              <a:ext uri="{FF2B5EF4-FFF2-40B4-BE49-F238E27FC236}">
+                <a16:creationId xmlns:a16="http://schemas.microsoft.com/office/drawing/2014/main" id="{A0B146F8-D8C2-8B4E-98C5-C933A927CB77}"/>
+              </a:ext>
+            </a:extLst>
+          </p:cNvPr>
+          <p:cNvPicPr>
+            <a:picLocks noChangeAspect="1"/>
+          </p:cNvPicPr>
+          <p:nvPr/>
+        </p:nvPicPr>
+        <p:blipFill>
+          <a:blip r:embed="rId3"/>
+          <a:stretch>
+            <a:fillRect/>
+          </a:stretch>
+        </p:blipFill>
+        <p:spPr>
+          <a:xfrm>
+            <a:off x="6403477" y="2194560"/>
+            <a:ext cx="5390060" cy="920115"/>
+          </a:xfrm>
+          <a:prstGeom prst="rect">
+            <a:avLst/>
+          </a:prstGeom>
+        </p:spPr>
+      </p:pic>
+    </p:spTree>
+    <p:extLst>
+      <p:ext uri="{BB962C8B-B14F-4D97-AF65-F5344CB8AC3E}">
+        <p14:creationId xmlns:p14="http://schemas.microsoft.com/office/powerpoint/2010/main" val="2750975502"/>
+      </p:ext>
+    </p:extLst>
+  </p:cSld>
+  <p:clrMapOvr>
+    <a:masterClrMapping/>
+  </p:clrMapOvr>
+</p:sld>
+</file>
+
+<file path=ppt/slides/slide9.xml><?xml version="1.0" encoding="utf-8"?>
+<p:sld xmlns:a="http://schemas.openxmlformats.org/drawingml/2006/main" xmlns:r="http://schemas.openxmlformats.org/officeDocument/2006/relationships" xmlns:p="http://schemas.openxmlformats.org/presentationml/2006/main">
+  <p:cSld>
+    <p:spTree>
+      <p:nvGrpSpPr>
+        <p:cNvPr id="1" name=""/>
+        <p:cNvGrpSpPr/>
+        <p:nvPr/>
+      </p:nvGrpSpPr>
+      <p:grpSpPr>
+        <a:xfrm>
+          <a:off x="0" y="0"/>
+          <a:ext cx="0" cy="0"/>
+          <a:chOff x="0" y="0"/>
+          <a:chExt cx="0" cy="0"/>
+        </a:xfrm>
+      </p:grpSpPr>
+      <p:sp>
+        <p:nvSpPr>
+          <p:cNvPr id="2" name="Title 1">
+            <a:extLst>
+              <a:ext uri="{FF2B5EF4-FFF2-40B4-BE49-F238E27FC236}">
+                <a16:creationId xmlns:a16="http://schemas.microsoft.com/office/drawing/2014/main" id="{1B979A2F-3360-514B-A85D-1EF038DB4654}"/>
+              </a:ext>
+            </a:extLst>
+          </p:cNvPr>
+          <p:cNvSpPr>
+            <a:spLocks noGrp="1"/>
+          </p:cNvSpPr>
+          <p:nvPr>
+            <p:ph type="title"/>
+          </p:nvPr>
+        </p:nvSpPr>
+        <p:spPr/>
+        <p:txBody>
+          <a:bodyPr/>
+          <a:lstStyle/>
+          <a:p>
+            <a:r>
+              <a:rPr lang="en-GB" dirty="0"/>
+              <a:t>Further work</a:t>
+            </a:r>
+          </a:p>
+        </p:txBody>
+      </p:sp>
+      <p:sp>
+        <p:nvSpPr>
+          <p:cNvPr id="3" name="Content Placeholder 2">
+            <a:extLst>
+              <a:ext uri="{FF2B5EF4-FFF2-40B4-BE49-F238E27FC236}">
+                <a16:creationId xmlns:a16="http://schemas.microsoft.com/office/drawing/2014/main" id="{150D9B10-1EFF-C446-BEFA-532D574536CC}"/>
+              </a:ext>
+            </a:extLst>
+          </p:cNvPr>
+          <p:cNvSpPr>
+            <a:spLocks noGrp="1"/>
+          </p:cNvSpPr>
+          <p:nvPr>
+            <p:ph idx="1"/>
+          </p:nvPr>
+        </p:nvSpPr>
+        <p:spPr/>
+        <p:txBody>
+          <a:bodyPr/>
+          <a:lstStyle/>
+          <a:p>
+            <a:endParaRPr lang="en-GB" dirty="0"/>
+          </a:p>
+        </p:txBody>
+      </p:sp>
+    </p:spTree>
+    <p:extLst>
+      <p:ext uri="{BB962C8B-B14F-4D97-AF65-F5344CB8AC3E}">
+        <p14:creationId xmlns:p14="http://schemas.microsoft.com/office/powerpoint/2010/main" val="4110682296"/>
       </p:ext>
     </p:extLst>
   </p:cSld>

</xml_diff>